<commit_message>
major update: now including complete workflow overview + new directory structure
</commit_message>
<xml_diff>
--- a/docs/workflow/figures_new.pptx
+++ b/docs/workflow/figures_new.pptx
@@ -6,7 +6,8 @@
   </p:sldMasterIdLst>
   <p:sldIdLst>
     <p:sldId id="256" r:id="rId2"/>
-    <p:sldId id="257" r:id="rId3"/>
+    <p:sldId id="258" r:id="rId3"/>
+    <p:sldId id="257" r:id="rId4"/>
   </p:sldIdLst>
   <p:sldSz cx="12192000" cy="6858000"/>
   <p:notesSz cx="6858000" cy="9144000"/>
@@ -242,7 +243,7 @@
           <a:p>
             <a:fld id="{88284623-0E0D-4847-B04C-72246EF8BFFA}" type="datetimeFigureOut">
               <a:rPr lang="en-US" smtClean="0"/>
-              <a:t>2/17/2020</a:t>
+              <a:t>2/18/2020</a:t>
             </a:fld>
             <a:endParaRPr lang="en-US"/>
           </a:p>
@@ -410,7 +411,7 @@
           <a:p>
             <a:fld id="{88284623-0E0D-4847-B04C-72246EF8BFFA}" type="datetimeFigureOut">
               <a:rPr lang="en-US" smtClean="0"/>
-              <a:t>2/17/2020</a:t>
+              <a:t>2/18/2020</a:t>
             </a:fld>
             <a:endParaRPr lang="en-US"/>
           </a:p>
@@ -588,7 +589,7 @@
           <a:p>
             <a:fld id="{88284623-0E0D-4847-B04C-72246EF8BFFA}" type="datetimeFigureOut">
               <a:rPr lang="en-US" smtClean="0"/>
-              <a:t>2/17/2020</a:t>
+              <a:t>2/18/2020</a:t>
             </a:fld>
             <a:endParaRPr lang="en-US"/>
           </a:p>
@@ -756,7 +757,7 @@
           <a:p>
             <a:fld id="{88284623-0E0D-4847-B04C-72246EF8BFFA}" type="datetimeFigureOut">
               <a:rPr lang="en-US" smtClean="0"/>
-              <a:t>2/17/2020</a:t>
+              <a:t>2/18/2020</a:t>
             </a:fld>
             <a:endParaRPr lang="en-US"/>
           </a:p>
@@ -1001,7 +1002,7 @@
           <a:p>
             <a:fld id="{88284623-0E0D-4847-B04C-72246EF8BFFA}" type="datetimeFigureOut">
               <a:rPr lang="en-US" smtClean="0"/>
-              <a:t>2/17/2020</a:t>
+              <a:t>2/18/2020</a:t>
             </a:fld>
             <a:endParaRPr lang="en-US"/>
           </a:p>
@@ -1230,7 +1231,7 @@
           <a:p>
             <a:fld id="{88284623-0E0D-4847-B04C-72246EF8BFFA}" type="datetimeFigureOut">
               <a:rPr lang="en-US" smtClean="0"/>
-              <a:t>2/17/2020</a:t>
+              <a:t>2/18/2020</a:t>
             </a:fld>
             <a:endParaRPr lang="en-US"/>
           </a:p>
@@ -1594,7 +1595,7 @@
           <a:p>
             <a:fld id="{88284623-0E0D-4847-B04C-72246EF8BFFA}" type="datetimeFigureOut">
               <a:rPr lang="en-US" smtClean="0"/>
-              <a:t>2/17/2020</a:t>
+              <a:t>2/18/2020</a:t>
             </a:fld>
             <a:endParaRPr lang="en-US"/>
           </a:p>
@@ -1711,7 +1712,7 @@
           <a:p>
             <a:fld id="{88284623-0E0D-4847-B04C-72246EF8BFFA}" type="datetimeFigureOut">
               <a:rPr lang="en-US" smtClean="0"/>
-              <a:t>2/17/2020</a:t>
+              <a:t>2/18/2020</a:t>
             </a:fld>
             <a:endParaRPr lang="en-US"/>
           </a:p>
@@ -1806,7 +1807,7 @@
           <a:p>
             <a:fld id="{88284623-0E0D-4847-B04C-72246EF8BFFA}" type="datetimeFigureOut">
               <a:rPr lang="en-US" smtClean="0"/>
-              <a:t>2/17/2020</a:t>
+              <a:t>2/18/2020</a:t>
             </a:fld>
             <a:endParaRPr lang="en-US"/>
           </a:p>
@@ -2081,7 +2082,7 @@
           <a:p>
             <a:fld id="{88284623-0E0D-4847-B04C-72246EF8BFFA}" type="datetimeFigureOut">
               <a:rPr lang="en-US" smtClean="0"/>
-              <a:t>2/17/2020</a:t>
+              <a:t>2/18/2020</a:t>
             </a:fld>
             <a:endParaRPr lang="en-US"/>
           </a:p>
@@ -2333,7 +2334,7 @@
           <a:p>
             <a:fld id="{88284623-0E0D-4847-B04C-72246EF8BFFA}" type="datetimeFigureOut">
               <a:rPr lang="en-US" smtClean="0"/>
-              <a:t>2/17/2020</a:t>
+              <a:t>2/18/2020</a:t>
             </a:fld>
             <a:endParaRPr lang="en-US"/>
           </a:p>
@@ -2544,7 +2545,7 @@
           <a:p>
             <a:fld id="{88284623-0E0D-4847-B04C-72246EF8BFFA}" type="datetimeFigureOut">
               <a:rPr lang="en-US" smtClean="0"/>
-              <a:t>2/17/2020</a:t>
+              <a:t>2/18/2020</a:t>
             </a:fld>
             <a:endParaRPr lang="en-US"/>
           </a:p>
@@ -3017,46 +3018,6 @@
           <a:chExt cx="0" cy="0"/>
         </a:xfrm>
       </p:grpSpPr>
-      <p:cxnSp>
-        <p:nvCxnSpPr>
-          <p:cNvPr id="46" name="Curved Connector 45"/>
-          <p:cNvCxnSpPr/>
-          <p:nvPr/>
-        </p:nvCxnSpPr>
-        <p:spPr>
-          <a:xfrm rot="16200000" flipH="1">
-            <a:off x="4238219" y="3210429"/>
-            <a:ext cx="2813095" cy="917402"/>
-          </a:xfrm>
-          <a:prstGeom prst="curvedConnector3">
-            <a:avLst>
-              <a:gd name="adj1" fmla="val 50000"/>
-            </a:avLst>
-          </a:prstGeom>
-          <a:ln>
-            <a:solidFill>
-              <a:schemeClr val="accent4">
-                <a:lumMod val="75000"/>
-              </a:schemeClr>
-            </a:solidFill>
-            <a:tailEnd type="triangle"/>
-          </a:ln>
-        </p:spPr>
-        <p:style>
-          <a:lnRef idx="1">
-            <a:schemeClr val="accent2"/>
-          </a:lnRef>
-          <a:fillRef idx="0">
-            <a:schemeClr val="accent2"/>
-          </a:fillRef>
-          <a:effectRef idx="0">
-            <a:schemeClr val="accent2"/>
-          </a:effectRef>
-          <a:fontRef idx="minor">
-            <a:schemeClr val="tx1"/>
-          </a:fontRef>
-        </p:style>
-      </p:cxnSp>
       <p:sp>
         <p:nvSpPr>
           <p:cNvPr id="6" name="TextBox 5"/>
@@ -3065,15 +3026,13 @@
         </p:nvSpPr>
         <p:spPr>
           <a:xfrm>
-            <a:off x="3304181" y="793746"/>
-            <a:ext cx="933269" cy="538609"/>
+            <a:off x="3304180" y="772166"/>
+            <a:ext cx="1083951" cy="677108"/>
           </a:xfrm>
           <a:prstGeom prst="rect">
             <a:avLst/>
           </a:prstGeom>
-          <a:solidFill>
-            <a:schemeClr val="bg1"/>
-          </a:solidFill>
+          <a:noFill/>
         </p:spPr>
         <p:txBody>
           <a:bodyPr wrap="none" rtlCol="0">
@@ -3082,16 +3041,40 @@
           <a:lstStyle/>
           <a:p>
             <a:r>
+              <a:rPr lang="en-US" sz="1100" b="1" dirty="0" smtClean="0"/>
+              <a:t>Raw data</a:t>
+            </a:r>
+            <a:r>
               <a:rPr lang="en-US" sz="1100" b="1" dirty="0"/>
-              <a:t>Raw data</a:t>
+              <a:t/>
             </a:r>
             <a:br>
               <a:rPr lang="en-US" sz="1100" b="1" dirty="0"/>
             </a:br>
             <a:r>
-              <a:rPr lang="en-US" sz="900" i="1" dirty="0"/>
-              <a:t>e.g., on server;</a:t>
-            </a:r>
+              <a:rPr lang="en-US" sz="900" i="1" dirty="0" smtClean="0"/>
+              <a:t>e.g</a:t>
+            </a:r>
+            <a:r>
+              <a:rPr lang="en-US" sz="900" i="1" dirty="0" smtClean="0"/>
+              <a:t>., files </a:t>
+            </a:r>
+            <a:r>
+              <a:rPr lang="en-US" sz="900" i="1" dirty="0" smtClean="0"/>
+              <a:t>on server</a:t>
+            </a:r>
+            <a:r>
+              <a:rPr lang="en-US" sz="900" i="1" dirty="0" smtClean="0"/>
+              <a:t>,</a:t>
+            </a:r>
+            <a:br>
+              <a:rPr lang="en-US" sz="900" i="1" dirty="0" smtClean="0"/>
+            </a:br>
+            <a:r>
+              <a:rPr lang="en-US" sz="900" i="1" dirty="0" smtClean="0"/>
+              <a:t>or in a database;</a:t>
+            </a:r>
+            <a:endParaRPr lang="en-US" sz="900" i="1" dirty="0"/>
           </a:p>
           <a:p>
             <a:r>
@@ -3124,7 +3107,7 @@
         </p:blipFill>
         <p:spPr>
           <a:xfrm>
-            <a:off x="3319181" y="1604592"/>
+            <a:off x="3508943" y="1618961"/>
             <a:ext cx="687754" cy="687754"/>
           </a:xfrm>
           <a:prstGeom prst="rect">
@@ -3154,8 +3137,8 @@
         </p:blipFill>
         <p:spPr>
           <a:xfrm>
-            <a:off x="4739286" y="1628238"/>
-            <a:ext cx="653998" cy="653998"/>
+            <a:off x="4916422" y="1620915"/>
+            <a:ext cx="685800" cy="685800"/>
           </a:xfrm>
           <a:prstGeom prst="rect">
             <a:avLst/>
@@ -3170,15 +3153,13 @@
         </p:nvSpPr>
         <p:spPr>
           <a:xfrm>
-            <a:off x="4736077" y="789216"/>
-            <a:ext cx="1074333" cy="677108"/>
+            <a:off x="4710682" y="772166"/>
+            <a:ext cx="1097280" cy="677108"/>
           </a:xfrm>
           <a:prstGeom prst="rect">
             <a:avLst/>
           </a:prstGeom>
-          <a:solidFill>
-            <a:schemeClr val="bg1"/>
-          </a:solidFill>
+          <a:noFill/>
         </p:spPr>
         <p:txBody>
           <a:bodyPr wrap="none" rtlCol="0">
@@ -3187,8 +3168,12 @@
           <a:lstStyle/>
           <a:p>
             <a:r>
+              <a:rPr lang="en-US" sz="1100" b="1" dirty="0" smtClean="0"/>
+              <a:t>Source code</a:t>
+            </a:r>
+            <a:r>
               <a:rPr lang="en-US" sz="1100" b="1" dirty="0"/>
-              <a:t>Code</a:t>
+              <a:t/>
             </a:r>
             <a:br>
               <a:rPr lang="en-US" sz="1100" b="1" dirty="0"/>
@@ -3220,37 +3205,6 @@
               <a:t>automatic backups</a:t>
             </a:r>
             <a:endParaRPr lang="en-US" sz="1600" b="1" dirty="0"/>
-          </a:p>
-        </p:txBody>
-      </p:sp>
-      <p:sp>
-        <p:nvSpPr>
-          <p:cNvPr id="11" name="TextBox 10"/>
-          <p:cNvSpPr txBox="1"/>
-          <p:nvPr/>
-        </p:nvSpPr>
-        <p:spPr>
-          <a:xfrm>
-            <a:off x="1962434" y="2679304"/>
-            <a:ext cx="1189749" cy="261610"/>
-          </a:xfrm>
-          <a:prstGeom prst="rect">
-            <a:avLst/>
-          </a:prstGeom>
-          <a:solidFill>
-            <a:schemeClr val="bg1"/>
-          </a:solidFill>
-        </p:spPr>
-        <p:txBody>
-          <a:bodyPr wrap="none" rtlCol="0">
-            <a:spAutoFit/>
-          </a:bodyPr>
-          <a:lstStyle/>
-          <a:p>
-            <a:r>
-              <a:rPr lang="en-US" sz="1100" b="1" dirty="0"/>
-              <a:t>Local computer 1</a:t>
-            </a:r>
           </a:p>
         </p:txBody>
       </p:sp>
@@ -3276,45 +3230,14 @@
         </p:blipFill>
         <p:spPr>
           <a:xfrm flipH="1">
-            <a:off x="2181780" y="2815950"/>
-            <a:ext cx="802062" cy="802062"/>
+            <a:off x="2588266" y="2700104"/>
+            <a:ext cx="685800" cy="685800"/>
           </a:xfrm>
           <a:prstGeom prst="rect">
             <a:avLst/>
           </a:prstGeom>
         </p:spPr>
       </p:pic>
-      <p:sp>
-        <p:nvSpPr>
-          <p:cNvPr id="15" name="TextBox 14"/>
-          <p:cNvSpPr txBox="1"/>
-          <p:nvPr/>
-        </p:nvSpPr>
-        <p:spPr>
-          <a:xfrm>
-            <a:off x="2017615" y="3800175"/>
-            <a:ext cx="1189749" cy="261610"/>
-          </a:xfrm>
-          <a:prstGeom prst="rect">
-            <a:avLst/>
-          </a:prstGeom>
-          <a:solidFill>
-            <a:schemeClr val="bg1"/>
-          </a:solidFill>
-        </p:spPr>
-        <p:txBody>
-          <a:bodyPr wrap="none" rtlCol="0">
-            <a:spAutoFit/>
-          </a:bodyPr>
-          <a:lstStyle/>
-          <a:p>
-            <a:r>
-              <a:rPr lang="en-US" sz="1100" b="1" dirty="0"/>
-              <a:t>Local computer 2</a:t>
-            </a:r>
-          </a:p>
-        </p:txBody>
-      </p:sp>
       <p:pic>
         <p:nvPicPr>
           <p:cNvPr id="17" name="Picture 16"/>
@@ -3337,8 +3260,8 @@
         </p:blipFill>
         <p:spPr>
           <a:xfrm>
-            <a:off x="2210597" y="3930980"/>
-            <a:ext cx="803784" cy="803784"/>
+            <a:off x="2588266" y="3660158"/>
+            <a:ext cx="685800" cy="685800"/>
           </a:xfrm>
           <a:prstGeom prst="rect">
             <a:avLst/>
@@ -3353,15 +3276,13 @@
         </p:nvSpPr>
         <p:spPr>
           <a:xfrm>
-            <a:off x="7403526" y="789216"/>
-            <a:ext cx="1281120" cy="984885"/>
+            <a:off x="7523686" y="772166"/>
+            <a:ext cx="1281120" cy="954107"/>
           </a:xfrm>
           <a:prstGeom prst="rect">
             <a:avLst/>
           </a:prstGeom>
-          <a:solidFill>
-            <a:schemeClr val="bg1"/>
-          </a:solidFill>
+          <a:noFill/>
         </p:spPr>
         <p:txBody>
           <a:bodyPr wrap="none" rtlCol="0">
@@ -3370,8 +3291,12 @@
           <a:lstStyle/>
           <a:p>
             <a:r>
+              <a:rPr lang="en-US" sz="1100" b="1" dirty="0" smtClean="0"/>
+              <a:t>File exchange</a:t>
+            </a:r>
+            <a:r>
               <a:rPr lang="en-US" sz="1100" b="1" dirty="0"/>
-              <a:t>Temp remote</a:t>
+              <a:t/>
             </a:r>
             <a:br>
               <a:rPr lang="en-US" sz="1100" b="1" dirty="0"/>
@@ -3434,45 +3359,14 @@
         </p:blipFill>
         <p:spPr>
           <a:xfrm>
-            <a:off x="7693842" y="1644486"/>
-            <a:ext cx="626559" cy="626559"/>
+            <a:off x="6322924" y="1620915"/>
+            <a:ext cx="685800" cy="685800"/>
           </a:xfrm>
           <a:prstGeom prst="rect">
             <a:avLst/>
           </a:prstGeom>
         </p:spPr>
       </p:pic>
-      <p:sp>
-        <p:nvSpPr>
-          <p:cNvPr id="23" name="TextBox 22"/>
-          <p:cNvSpPr txBox="1"/>
-          <p:nvPr/>
-        </p:nvSpPr>
-        <p:spPr>
-          <a:xfrm>
-            <a:off x="2106704" y="4777229"/>
-            <a:ext cx="1045479" cy="261610"/>
-          </a:xfrm>
-          <a:prstGeom prst="rect">
-            <a:avLst/>
-          </a:prstGeom>
-          <a:solidFill>
-            <a:schemeClr val="bg1"/>
-          </a:solidFill>
-        </p:spPr>
-        <p:txBody>
-          <a:bodyPr wrap="none" rtlCol="0">
-            <a:spAutoFit/>
-          </a:bodyPr>
-          <a:lstStyle/>
-          <a:p>
-            <a:r>
-              <a:rPr lang="en-US" sz="1100" b="1" dirty="0"/>
-              <a:t>Cloud Instance</a:t>
-            </a:r>
-          </a:p>
-        </p:txBody>
-      </p:sp>
       <p:pic>
         <p:nvPicPr>
           <p:cNvPr id="25" name="Picture 24"/>
@@ -3495,8 +3389,8 @@
         </p:blipFill>
         <p:spPr>
           <a:xfrm>
-            <a:off x="2206318" y="4865569"/>
-            <a:ext cx="846249" cy="846249"/>
+            <a:off x="2588266" y="4621748"/>
+            <a:ext cx="685800" cy="685800"/>
           </a:xfrm>
           <a:prstGeom prst="rect">
             <a:avLst/>
@@ -3566,8 +3460,8 @@
         </p:nvSpPr>
         <p:spPr>
           <a:xfrm>
-            <a:off x="1534578" y="2463210"/>
-            <a:ext cx="279812" cy="3248608"/>
+            <a:off x="1935735" y="2700104"/>
+            <a:ext cx="279812" cy="3637502"/>
           </a:xfrm>
           <a:prstGeom prst="rect">
             <a:avLst/>
@@ -3608,6 +3502,1742 @@
                   <a:schemeClr val="bg1"/>
                 </a:solidFill>
               </a:rPr>
+              <a:t>Project </a:t>
+            </a:r>
+            <a:r>
+              <a:rPr lang="en-US" sz="1600" dirty="0" smtClean="0">
+                <a:solidFill>
+                  <a:schemeClr val="bg1"/>
+                </a:solidFill>
+              </a:rPr>
+              <a:t>pipeline</a:t>
+            </a:r>
+            <a:endParaRPr lang="en-US" sz="1600" dirty="0">
+              <a:solidFill>
+                <a:schemeClr val="bg1"/>
+              </a:solidFill>
+            </a:endParaRPr>
+          </a:p>
+        </p:txBody>
+      </p:sp>
+      <p:pic>
+        <p:nvPicPr>
+          <p:cNvPr id="55" name="Picture 54"/>
+          <p:cNvPicPr>
+            <a:picLocks noChangeAspect="1"/>
+          </p:cNvPicPr>
+          <p:nvPr/>
+        </p:nvPicPr>
+        <p:blipFill>
+          <a:blip r:embed="rId8" cstate="print">
+            <a:extLst>
+              <a:ext uri="{28A0092B-C50C-407E-A947-70E740481C1C}">
+                <a14:useLocalDpi xmlns:a14="http://schemas.microsoft.com/office/drawing/2010/main" val="0"/>
+              </a:ext>
+            </a:extLst>
+          </a:blip>
+          <a:stretch>
+            <a:fillRect/>
+          </a:stretch>
+        </p:blipFill>
+        <p:spPr>
+          <a:xfrm>
+            <a:off x="9135929" y="1620915"/>
+            <a:ext cx="685800" cy="685800"/>
+          </a:xfrm>
+          <a:prstGeom prst="rect">
+            <a:avLst/>
+          </a:prstGeom>
+        </p:spPr>
+      </p:pic>
+      <p:sp>
+        <p:nvSpPr>
+          <p:cNvPr id="56" name="TextBox 55"/>
+          <p:cNvSpPr txBox="1"/>
+          <p:nvPr/>
+        </p:nvSpPr>
+        <p:spPr>
+          <a:xfrm>
+            <a:off x="8930189" y="772166"/>
+            <a:ext cx="1097280" cy="815608"/>
+          </a:xfrm>
+          <a:prstGeom prst="rect">
+            <a:avLst/>
+          </a:prstGeom>
+          <a:noFill/>
+        </p:spPr>
+        <p:txBody>
+          <a:bodyPr wrap="square" rtlCol="0">
+            <a:spAutoFit/>
+          </a:bodyPr>
+          <a:lstStyle/>
+          <a:p>
+            <a:r>
+              <a:rPr lang="en-US" sz="1100" b="1" dirty="0"/>
+              <a:t>Notes</a:t>
+            </a:r>
+            <a:br>
+              <a:rPr lang="en-US" sz="1100" b="1" dirty="0"/>
+            </a:br>
+            <a:r>
+              <a:rPr lang="en-US" sz="900" i="1" dirty="0"/>
+              <a:t>e.g., meeting notes, </a:t>
+            </a:r>
+            <a:r>
+              <a:rPr lang="en-US" sz="900" i="1" dirty="0" smtClean="0"/>
+              <a:t>literature: </a:t>
+            </a:r>
+            <a:r>
+              <a:rPr lang="en-US" sz="900" i="1" dirty="0"/>
+              <a:t>keep on </a:t>
+            </a:r>
+            <a:r>
+              <a:rPr lang="en-US" sz="900" i="1" dirty="0" smtClean="0"/>
+              <a:t>cloud like Dropbox,</a:t>
+            </a:r>
+            <a:r>
+              <a:rPr lang="en-US" sz="900" i="1" dirty="0"/>
+              <a:t/>
+            </a:r>
+            <a:br>
+              <a:rPr lang="en-US" sz="900" i="1" dirty="0"/>
+            </a:br>
+            <a:r>
+              <a:rPr lang="en-US" sz="900" i="1" dirty="0"/>
+              <a:t>automatic backups</a:t>
+            </a:r>
+            <a:endParaRPr lang="en-US" sz="1100" b="1" i="1" dirty="0"/>
+          </a:p>
+        </p:txBody>
+      </p:sp>
+      <p:sp>
+        <p:nvSpPr>
+          <p:cNvPr id="28" name="TextBox 27">
+            <a:extLst>
+              <a:ext uri="{FF2B5EF4-FFF2-40B4-BE49-F238E27FC236}">
+                <a16:creationId xmlns:a16="http://schemas.microsoft.com/office/drawing/2014/main" id="{061119A4-F7A6-4B14-A4F4-0B608E31FF4A}"/>
+              </a:ext>
+            </a:extLst>
+          </p:cNvPr>
+          <p:cNvSpPr txBox="1"/>
+          <p:nvPr/>
+        </p:nvSpPr>
+        <p:spPr>
+          <a:xfrm>
+            <a:off x="6117184" y="772166"/>
+            <a:ext cx="1215397" cy="815608"/>
+          </a:xfrm>
+          <a:prstGeom prst="rect">
+            <a:avLst/>
+          </a:prstGeom>
+          <a:noFill/>
+        </p:spPr>
+        <p:txBody>
+          <a:bodyPr wrap="none" rtlCol="0">
+            <a:spAutoFit/>
+          </a:bodyPr>
+          <a:lstStyle/>
+          <a:p>
+            <a:r>
+              <a:rPr lang="en-US" sz="1100" b="1" dirty="0" smtClean="0"/>
+              <a:t>Generated temp</a:t>
+            </a:r>
+            <a:r>
+              <a:rPr lang="en-US" sz="1100" b="1" dirty="0"/>
+              <a:t/>
+            </a:r>
+            <a:br>
+              <a:rPr lang="en-US" sz="1100" b="1" dirty="0"/>
+            </a:br>
+            <a:r>
+              <a:rPr lang="en-US" sz="900" i="1" dirty="0"/>
+              <a:t>temporary files (e.g., </a:t>
+            </a:r>
+            <a:br>
+              <a:rPr lang="en-US" sz="900" i="1" dirty="0"/>
+            </a:br>
+            <a:r>
+              <a:rPr lang="en-US" sz="900" i="1" dirty="0"/>
+              <a:t>converted datasets);</a:t>
+            </a:r>
+            <a:br>
+              <a:rPr lang="en-US" sz="900" i="1" dirty="0"/>
+            </a:br>
+            <a:r>
+              <a:rPr lang="en-US" sz="900" i="1" dirty="0"/>
+              <a:t>all generated by code,</a:t>
+            </a:r>
+            <a:br>
+              <a:rPr lang="en-US" sz="900" i="1" dirty="0"/>
+            </a:br>
+            <a:r>
+              <a:rPr lang="en-US" sz="900" i="1" dirty="0"/>
+              <a:t>and kept locally</a:t>
+            </a:r>
+            <a:endParaRPr lang="en-US" sz="1600" b="1" dirty="0"/>
+          </a:p>
+        </p:txBody>
+      </p:sp>
+      <p:pic>
+        <p:nvPicPr>
+          <p:cNvPr id="3" name="Picture 2"/>
+          <p:cNvPicPr>
+            <a:picLocks noChangeAspect="1"/>
+          </p:cNvPicPr>
+          <p:nvPr/>
+        </p:nvPicPr>
+        <p:blipFill>
+          <a:blip r:embed="rId9" cstate="print">
+            <a:extLst>
+              <a:ext uri="{28A0092B-C50C-407E-A947-70E740481C1C}">
+                <a14:useLocalDpi xmlns:a14="http://schemas.microsoft.com/office/drawing/2010/main" val="0"/>
+              </a:ext>
+            </a:extLst>
+          </a:blip>
+          <a:stretch>
+            <a:fillRect/>
+          </a:stretch>
+        </p:blipFill>
+        <p:spPr>
+          <a:xfrm>
+            <a:off x="7821346" y="1620915"/>
+            <a:ext cx="685800" cy="685800"/>
+          </a:xfrm>
+          <a:prstGeom prst="rect">
+            <a:avLst/>
+          </a:prstGeom>
+        </p:spPr>
+      </p:pic>
+      <p:cxnSp>
+        <p:nvCxnSpPr>
+          <p:cNvPr id="5" name="Straight Arrow Connector 4"/>
+          <p:cNvCxnSpPr/>
+          <p:nvPr/>
+        </p:nvCxnSpPr>
+        <p:spPr>
+          <a:xfrm flipH="1">
+            <a:off x="3859437" y="2294544"/>
+            <a:ext cx="2884" cy="561817"/>
+          </a:xfrm>
+          <a:prstGeom prst="straightConnector1">
+            <a:avLst/>
+          </a:prstGeom>
+          <a:ln w="12700">
+            <a:prstDash val="solid"/>
+            <a:tailEnd type="triangle"/>
+          </a:ln>
+        </p:spPr>
+        <p:style>
+          <a:lnRef idx="1">
+            <a:schemeClr val="accent1"/>
+          </a:lnRef>
+          <a:fillRef idx="0">
+            <a:schemeClr val="accent1"/>
+          </a:fillRef>
+          <a:effectRef idx="0">
+            <a:schemeClr val="accent1"/>
+          </a:effectRef>
+          <a:fontRef idx="minor">
+            <a:schemeClr val="tx1"/>
+          </a:fontRef>
+        </p:style>
+      </p:cxnSp>
+      <p:pic>
+        <p:nvPicPr>
+          <p:cNvPr id="58" name="Picture 57"/>
+          <p:cNvPicPr>
+            <a:picLocks noChangeAspect="1"/>
+          </p:cNvPicPr>
+          <p:nvPr/>
+        </p:nvPicPr>
+        <p:blipFill>
+          <a:blip r:embed="rId5" cstate="print">
+            <a:extLst>
+              <a:ext uri="{28A0092B-C50C-407E-A947-70E740481C1C}">
+                <a14:useLocalDpi xmlns:a14="http://schemas.microsoft.com/office/drawing/2010/main" val="0"/>
+              </a:ext>
+            </a:extLst>
+          </a:blip>
+          <a:stretch>
+            <a:fillRect/>
+          </a:stretch>
+        </p:blipFill>
+        <p:spPr>
+          <a:xfrm>
+            <a:off x="2588266" y="5582569"/>
+            <a:ext cx="685800" cy="685800"/>
+          </a:xfrm>
+          <a:prstGeom prst="rect">
+            <a:avLst/>
+          </a:prstGeom>
+        </p:spPr>
+      </p:pic>
+      <p:grpSp>
+        <p:nvGrpSpPr>
+          <p:cNvPr id="65" name="Group 64"/>
+          <p:cNvGrpSpPr/>
+          <p:nvPr/>
+        </p:nvGrpSpPr>
+        <p:grpSpPr>
+          <a:xfrm>
+            <a:off x="5079273" y="2289612"/>
+            <a:ext cx="360099" cy="3429000"/>
+            <a:chOff x="5133844" y="2289612"/>
+            <a:chExt cx="360099" cy="3429000"/>
+          </a:xfrm>
+        </p:grpSpPr>
+        <p:cxnSp>
+          <p:nvCxnSpPr>
+            <p:cNvPr id="49" name="Straight Arrow Connector 48"/>
+            <p:cNvCxnSpPr/>
+            <p:nvPr/>
+          </p:nvCxnSpPr>
+          <p:spPr>
+            <a:xfrm flipH="1">
+              <a:off x="5233099" y="2294544"/>
+              <a:ext cx="15918" cy="1508760"/>
+            </a:xfrm>
+            <a:prstGeom prst="straightConnector1">
+              <a:avLst/>
+            </a:prstGeom>
+            <a:ln w="12700">
+              <a:solidFill>
+                <a:schemeClr val="accent2">
+                  <a:lumMod val="40000"/>
+                  <a:lumOff val="60000"/>
+                </a:schemeClr>
+              </a:solidFill>
+              <a:prstDash val="solid"/>
+              <a:headEnd type="triangle"/>
+              <a:tailEnd type="triangle"/>
+            </a:ln>
+          </p:spPr>
+          <p:style>
+            <a:lnRef idx="1">
+              <a:schemeClr val="accent1"/>
+            </a:lnRef>
+            <a:fillRef idx="0">
+              <a:schemeClr val="accent1"/>
+            </a:fillRef>
+            <a:effectRef idx="0">
+              <a:schemeClr val="accent1"/>
+            </a:effectRef>
+            <a:fontRef idx="minor">
+              <a:schemeClr val="tx1"/>
+            </a:fontRef>
+          </p:style>
+        </p:cxnSp>
+        <p:cxnSp>
+          <p:nvCxnSpPr>
+            <p:cNvPr id="41" name="Straight Arrow Connector 40"/>
+            <p:cNvCxnSpPr/>
+            <p:nvPr/>
+          </p:nvCxnSpPr>
+          <p:spPr>
+            <a:xfrm flipH="1">
+              <a:off x="5133844" y="2294544"/>
+              <a:ext cx="2884" cy="561817"/>
+            </a:xfrm>
+            <a:prstGeom prst="straightConnector1">
+              <a:avLst/>
+            </a:prstGeom>
+            <a:ln w="12700">
+              <a:prstDash val="solid"/>
+              <a:headEnd type="triangle"/>
+              <a:tailEnd type="triangle"/>
+            </a:ln>
+          </p:spPr>
+          <p:style>
+            <a:lnRef idx="1">
+              <a:schemeClr val="accent1"/>
+            </a:lnRef>
+            <a:fillRef idx="0">
+              <a:schemeClr val="accent1"/>
+            </a:fillRef>
+            <a:effectRef idx="0">
+              <a:schemeClr val="accent1"/>
+            </a:effectRef>
+            <a:fontRef idx="minor">
+              <a:schemeClr val="tx1"/>
+            </a:fontRef>
+          </p:style>
+        </p:cxnSp>
+        <p:cxnSp>
+          <p:nvCxnSpPr>
+            <p:cNvPr id="52" name="Straight Arrow Connector 51"/>
+            <p:cNvCxnSpPr/>
+            <p:nvPr/>
+          </p:nvCxnSpPr>
+          <p:spPr>
+            <a:xfrm flipH="1">
+              <a:off x="5345388" y="2294544"/>
+              <a:ext cx="26092" cy="2468880"/>
+            </a:xfrm>
+            <a:prstGeom prst="straightConnector1">
+              <a:avLst/>
+            </a:prstGeom>
+            <a:ln w="12700">
+              <a:solidFill>
+                <a:schemeClr val="accent2">
+                  <a:lumMod val="50000"/>
+                </a:schemeClr>
+              </a:solidFill>
+              <a:prstDash val="solid"/>
+              <a:headEnd type="triangle"/>
+              <a:tailEnd type="triangle"/>
+            </a:ln>
+          </p:spPr>
+          <p:style>
+            <a:lnRef idx="1">
+              <a:schemeClr val="accent1"/>
+            </a:lnRef>
+            <a:fillRef idx="0">
+              <a:schemeClr val="accent1"/>
+            </a:fillRef>
+            <a:effectRef idx="0">
+              <a:schemeClr val="accent1"/>
+            </a:effectRef>
+            <a:fontRef idx="minor">
+              <a:schemeClr val="tx1"/>
+            </a:fontRef>
+          </p:style>
+        </p:cxnSp>
+        <p:cxnSp>
+          <p:nvCxnSpPr>
+            <p:cNvPr id="61" name="Straight Arrow Connector 60"/>
+            <p:cNvCxnSpPr/>
+            <p:nvPr/>
+          </p:nvCxnSpPr>
+          <p:spPr>
+            <a:xfrm flipH="1">
+              <a:off x="5467851" y="2289612"/>
+              <a:ext cx="26092" cy="3429000"/>
+            </a:xfrm>
+            <a:prstGeom prst="straightConnector1">
+              <a:avLst/>
+            </a:prstGeom>
+            <a:ln w="12700">
+              <a:solidFill>
+                <a:schemeClr val="accent6">
+                  <a:lumMod val="75000"/>
+                </a:schemeClr>
+              </a:solidFill>
+              <a:prstDash val="solid"/>
+              <a:headEnd type="triangle"/>
+              <a:tailEnd type="triangle"/>
+            </a:ln>
+          </p:spPr>
+          <p:style>
+            <a:lnRef idx="1">
+              <a:schemeClr val="accent1"/>
+            </a:lnRef>
+            <a:fillRef idx="0">
+              <a:schemeClr val="accent1"/>
+            </a:fillRef>
+            <a:effectRef idx="0">
+              <a:schemeClr val="accent1"/>
+            </a:effectRef>
+            <a:fontRef idx="minor">
+              <a:schemeClr val="tx1"/>
+            </a:fontRef>
+          </p:style>
+        </p:cxnSp>
+      </p:grpSp>
+      <p:grpSp>
+        <p:nvGrpSpPr>
+          <p:cNvPr id="66" name="Group 65"/>
+          <p:cNvGrpSpPr/>
+          <p:nvPr/>
+        </p:nvGrpSpPr>
+        <p:grpSpPr>
+          <a:xfrm>
+            <a:off x="6489689" y="2289612"/>
+            <a:ext cx="352271" cy="3429000"/>
+            <a:chOff x="6544260" y="2289612"/>
+            <a:chExt cx="352271" cy="3429000"/>
+          </a:xfrm>
+        </p:grpSpPr>
+        <p:cxnSp>
+          <p:nvCxnSpPr>
+            <p:cNvPr id="47" name="Straight Arrow Connector 46"/>
+            <p:cNvCxnSpPr/>
+            <p:nvPr/>
+          </p:nvCxnSpPr>
+          <p:spPr>
+            <a:xfrm flipH="1">
+              <a:off x="6544260" y="2294544"/>
+              <a:ext cx="2884" cy="561817"/>
+            </a:xfrm>
+            <a:prstGeom prst="straightConnector1">
+              <a:avLst/>
+            </a:prstGeom>
+            <a:ln w="12700">
+              <a:prstDash val="solid"/>
+              <a:headEnd type="triangle"/>
+              <a:tailEnd type="triangle"/>
+            </a:ln>
+          </p:spPr>
+          <p:style>
+            <a:lnRef idx="1">
+              <a:schemeClr val="accent1"/>
+            </a:lnRef>
+            <a:fillRef idx="0">
+              <a:schemeClr val="accent1"/>
+            </a:fillRef>
+            <a:effectRef idx="0">
+              <a:schemeClr val="accent1"/>
+            </a:effectRef>
+            <a:fontRef idx="minor">
+              <a:schemeClr val="tx1"/>
+            </a:fontRef>
+          </p:style>
+        </p:cxnSp>
+        <p:cxnSp>
+          <p:nvCxnSpPr>
+            <p:cNvPr id="50" name="Straight Arrow Connector 49"/>
+            <p:cNvCxnSpPr/>
+            <p:nvPr/>
+          </p:nvCxnSpPr>
+          <p:spPr>
+            <a:xfrm flipH="1">
+              <a:off x="6640906" y="2294544"/>
+              <a:ext cx="15918" cy="1508760"/>
+            </a:xfrm>
+            <a:prstGeom prst="straightConnector1">
+              <a:avLst/>
+            </a:prstGeom>
+            <a:ln w="12700">
+              <a:solidFill>
+                <a:schemeClr val="accent2">
+                  <a:lumMod val="40000"/>
+                  <a:lumOff val="60000"/>
+                </a:schemeClr>
+              </a:solidFill>
+              <a:prstDash val="solid"/>
+              <a:headEnd type="triangle"/>
+              <a:tailEnd type="triangle"/>
+            </a:ln>
+          </p:spPr>
+          <p:style>
+            <a:lnRef idx="1">
+              <a:schemeClr val="accent1"/>
+            </a:lnRef>
+            <a:fillRef idx="0">
+              <a:schemeClr val="accent1"/>
+            </a:fillRef>
+            <a:effectRef idx="0">
+              <a:schemeClr val="accent1"/>
+            </a:effectRef>
+            <a:fontRef idx="minor">
+              <a:schemeClr val="tx1"/>
+            </a:fontRef>
+          </p:style>
+        </p:cxnSp>
+        <p:cxnSp>
+          <p:nvCxnSpPr>
+            <p:cNvPr id="53" name="Straight Arrow Connector 52"/>
+            <p:cNvCxnSpPr/>
+            <p:nvPr/>
+          </p:nvCxnSpPr>
+          <p:spPr>
+            <a:xfrm flipH="1">
+              <a:off x="6750586" y="2294544"/>
+              <a:ext cx="26092" cy="2468880"/>
+            </a:xfrm>
+            <a:prstGeom prst="straightConnector1">
+              <a:avLst/>
+            </a:prstGeom>
+            <a:ln w="12700">
+              <a:solidFill>
+                <a:schemeClr val="accent2">
+                  <a:lumMod val="50000"/>
+                </a:schemeClr>
+              </a:solidFill>
+              <a:prstDash val="solid"/>
+              <a:headEnd type="triangle"/>
+              <a:tailEnd type="triangle"/>
+            </a:ln>
+          </p:spPr>
+          <p:style>
+            <a:lnRef idx="1">
+              <a:schemeClr val="accent1"/>
+            </a:lnRef>
+            <a:fillRef idx="0">
+              <a:schemeClr val="accent1"/>
+            </a:fillRef>
+            <a:effectRef idx="0">
+              <a:schemeClr val="accent1"/>
+            </a:effectRef>
+            <a:fontRef idx="minor">
+              <a:schemeClr val="tx1"/>
+            </a:fontRef>
+          </p:style>
+        </p:cxnSp>
+        <p:cxnSp>
+          <p:nvCxnSpPr>
+            <p:cNvPr id="62" name="Straight Arrow Connector 61"/>
+            <p:cNvCxnSpPr/>
+            <p:nvPr/>
+          </p:nvCxnSpPr>
+          <p:spPr>
+            <a:xfrm flipH="1">
+              <a:off x="6870439" y="2289612"/>
+              <a:ext cx="26092" cy="3429000"/>
+            </a:xfrm>
+            <a:prstGeom prst="straightConnector1">
+              <a:avLst/>
+            </a:prstGeom>
+            <a:ln w="12700">
+              <a:solidFill>
+                <a:schemeClr val="accent6">
+                  <a:lumMod val="75000"/>
+                </a:schemeClr>
+              </a:solidFill>
+              <a:prstDash val="solid"/>
+              <a:headEnd type="triangle"/>
+              <a:tailEnd type="triangle"/>
+            </a:ln>
+          </p:spPr>
+          <p:style>
+            <a:lnRef idx="1">
+              <a:schemeClr val="accent1"/>
+            </a:lnRef>
+            <a:fillRef idx="0">
+              <a:schemeClr val="accent1"/>
+            </a:fillRef>
+            <a:effectRef idx="0">
+              <a:schemeClr val="accent1"/>
+            </a:effectRef>
+            <a:fontRef idx="minor">
+              <a:schemeClr val="tx1"/>
+            </a:fontRef>
+          </p:style>
+        </p:cxnSp>
+      </p:grpSp>
+      <p:grpSp>
+        <p:nvGrpSpPr>
+          <p:cNvPr id="67" name="Group 66"/>
+          <p:cNvGrpSpPr/>
+          <p:nvPr/>
+        </p:nvGrpSpPr>
+        <p:grpSpPr>
+          <a:xfrm>
+            <a:off x="7989121" y="2289612"/>
+            <a:ext cx="350251" cy="3429000"/>
+            <a:chOff x="8043692" y="2289612"/>
+            <a:chExt cx="350251" cy="3429000"/>
+          </a:xfrm>
+        </p:grpSpPr>
+        <p:cxnSp>
+          <p:nvCxnSpPr>
+            <p:cNvPr id="48" name="Straight Arrow Connector 47"/>
+            <p:cNvCxnSpPr/>
+            <p:nvPr/>
+          </p:nvCxnSpPr>
+          <p:spPr>
+            <a:xfrm flipH="1">
+              <a:off x="8043692" y="2294544"/>
+              <a:ext cx="2884" cy="561817"/>
+            </a:xfrm>
+            <a:prstGeom prst="straightConnector1">
+              <a:avLst/>
+            </a:prstGeom>
+            <a:ln w="12700">
+              <a:prstDash val="solid"/>
+              <a:headEnd type="triangle"/>
+              <a:tailEnd type="none"/>
+            </a:ln>
+          </p:spPr>
+          <p:style>
+            <a:lnRef idx="1">
+              <a:schemeClr val="accent1"/>
+            </a:lnRef>
+            <a:fillRef idx="0">
+              <a:schemeClr val="accent1"/>
+            </a:fillRef>
+            <a:effectRef idx="0">
+              <a:schemeClr val="accent1"/>
+            </a:effectRef>
+            <a:fontRef idx="minor">
+              <a:schemeClr val="tx1"/>
+            </a:fontRef>
+          </p:style>
+        </p:cxnSp>
+        <p:cxnSp>
+          <p:nvCxnSpPr>
+            <p:cNvPr id="51" name="Straight Arrow Connector 50"/>
+            <p:cNvCxnSpPr/>
+            <p:nvPr/>
+          </p:nvCxnSpPr>
+          <p:spPr>
+            <a:xfrm flipH="1">
+              <a:off x="8139664" y="2294544"/>
+              <a:ext cx="15918" cy="1508760"/>
+            </a:xfrm>
+            <a:prstGeom prst="straightConnector1">
+              <a:avLst/>
+            </a:prstGeom>
+            <a:ln w="12700">
+              <a:solidFill>
+                <a:schemeClr val="accent2">
+                  <a:lumMod val="40000"/>
+                  <a:lumOff val="60000"/>
+                </a:schemeClr>
+              </a:solidFill>
+              <a:prstDash val="solid"/>
+              <a:headEnd type="triangle"/>
+              <a:tailEnd type="triangle"/>
+            </a:ln>
+          </p:spPr>
+          <p:style>
+            <a:lnRef idx="1">
+              <a:schemeClr val="accent1"/>
+            </a:lnRef>
+            <a:fillRef idx="0">
+              <a:schemeClr val="accent1"/>
+            </a:fillRef>
+            <a:effectRef idx="0">
+              <a:schemeClr val="accent1"/>
+            </a:effectRef>
+            <a:fontRef idx="minor">
+              <a:schemeClr val="tx1"/>
+            </a:fontRef>
+          </p:style>
+        </p:cxnSp>
+        <p:cxnSp>
+          <p:nvCxnSpPr>
+            <p:cNvPr id="54" name="Straight Arrow Connector 53"/>
+            <p:cNvCxnSpPr/>
+            <p:nvPr/>
+          </p:nvCxnSpPr>
+          <p:spPr>
+            <a:xfrm flipH="1">
+              <a:off x="8248670" y="2294544"/>
+              <a:ext cx="26092" cy="2468880"/>
+            </a:xfrm>
+            <a:prstGeom prst="straightConnector1">
+              <a:avLst/>
+            </a:prstGeom>
+            <a:ln w="12700">
+              <a:solidFill>
+                <a:schemeClr val="accent2">
+                  <a:lumMod val="50000"/>
+                </a:schemeClr>
+              </a:solidFill>
+              <a:prstDash val="solid"/>
+              <a:headEnd type="triangle"/>
+              <a:tailEnd type="triangle"/>
+            </a:ln>
+          </p:spPr>
+          <p:style>
+            <a:lnRef idx="1">
+              <a:schemeClr val="accent1"/>
+            </a:lnRef>
+            <a:fillRef idx="0">
+              <a:schemeClr val="accent1"/>
+            </a:fillRef>
+            <a:effectRef idx="0">
+              <a:schemeClr val="accent1"/>
+            </a:effectRef>
+            <a:fontRef idx="minor">
+              <a:schemeClr val="tx1"/>
+            </a:fontRef>
+          </p:style>
+        </p:cxnSp>
+        <p:cxnSp>
+          <p:nvCxnSpPr>
+            <p:cNvPr id="63" name="Straight Arrow Connector 62"/>
+            <p:cNvCxnSpPr/>
+            <p:nvPr/>
+          </p:nvCxnSpPr>
+          <p:spPr>
+            <a:xfrm flipH="1">
+              <a:off x="8367851" y="2289612"/>
+              <a:ext cx="26092" cy="3429000"/>
+            </a:xfrm>
+            <a:prstGeom prst="straightConnector1">
+              <a:avLst/>
+            </a:prstGeom>
+            <a:ln w="12700">
+              <a:solidFill>
+                <a:schemeClr val="accent6">
+                  <a:lumMod val="75000"/>
+                </a:schemeClr>
+              </a:solidFill>
+              <a:prstDash val="solid"/>
+              <a:headEnd type="none"/>
+              <a:tailEnd type="triangle"/>
+            </a:ln>
+          </p:spPr>
+          <p:style>
+            <a:lnRef idx="1">
+              <a:schemeClr val="accent1"/>
+            </a:lnRef>
+            <a:fillRef idx="0">
+              <a:schemeClr val="accent1"/>
+            </a:fillRef>
+            <a:effectRef idx="0">
+              <a:schemeClr val="accent1"/>
+            </a:effectRef>
+            <a:fontRef idx="minor">
+              <a:schemeClr val="tx1"/>
+            </a:fontRef>
+          </p:style>
+        </p:cxnSp>
+      </p:grpSp>
+      <p:sp>
+        <p:nvSpPr>
+          <p:cNvPr id="37" name="TextBox 36"/>
+          <p:cNvSpPr txBox="1"/>
+          <p:nvPr/>
+        </p:nvSpPr>
+        <p:spPr>
+          <a:xfrm>
+            <a:off x="3645326" y="2912199"/>
+            <a:ext cx="5029200" cy="261610"/>
+          </a:xfrm>
+          <a:prstGeom prst="rect">
+            <a:avLst/>
+          </a:prstGeom>
+          <a:solidFill>
+            <a:schemeClr val="bg1"/>
+          </a:solidFill>
+          <a:ln>
+            <a:solidFill>
+              <a:schemeClr val="tx1"/>
+            </a:solidFill>
+          </a:ln>
+        </p:spPr>
+        <p:txBody>
+          <a:bodyPr wrap="square" rtlCol="0">
+            <a:spAutoFit/>
+          </a:bodyPr>
+          <a:lstStyle/>
+          <a:p>
+            <a:pPr algn="ctr"/>
+            <a:r>
+              <a:rPr lang="en-US" sz="1100" i="1" dirty="0" smtClean="0"/>
+              <a:t>Prepare raw data set for analysis; pass final dataset to file exchange</a:t>
+            </a:r>
+            <a:endParaRPr lang="en-US" sz="1100" i="1" dirty="0"/>
+          </a:p>
+        </p:txBody>
+      </p:sp>
+      <p:sp>
+        <p:nvSpPr>
+          <p:cNvPr id="44" name="TextBox 43"/>
+          <p:cNvSpPr txBox="1"/>
+          <p:nvPr/>
+        </p:nvSpPr>
+        <p:spPr>
+          <a:xfrm>
+            <a:off x="3645326" y="4833843"/>
+            <a:ext cx="5029200" cy="261610"/>
+          </a:xfrm>
+          <a:prstGeom prst="rect">
+            <a:avLst/>
+          </a:prstGeom>
+          <a:solidFill>
+            <a:schemeClr val="bg1"/>
+          </a:solidFill>
+          <a:ln>
+            <a:solidFill>
+              <a:schemeClr val="tx1"/>
+            </a:solidFill>
+          </a:ln>
+        </p:spPr>
+        <p:txBody>
+          <a:bodyPr wrap="square" rtlCol="0">
+            <a:spAutoFit/>
+          </a:bodyPr>
+          <a:lstStyle/>
+          <a:p>
+            <a:pPr algn="ctr"/>
+            <a:r>
+              <a:rPr lang="en-US" sz="1100" i="1" dirty="0" smtClean="0"/>
+              <a:t>Estimate final model on full data set; write model results to file exchange</a:t>
+            </a:r>
+            <a:endParaRPr lang="en-US" sz="1100" i="1" dirty="0"/>
+          </a:p>
+        </p:txBody>
+      </p:sp>
+      <p:sp>
+        <p:nvSpPr>
+          <p:cNvPr id="42" name="TextBox 41"/>
+          <p:cNvSpPr txBox="1"/>
+          <p:nvPr/>
+        </p:nvSpPr>
+        <p:spPr>
+          <a:xfrm>
+            <a:off x="3645326" y="3873021"/>
+            <a:ext cx="5029200" cy="261610"/>
+          </a:xfrm>
+          <a:prstGeom prst="rect">
+            <a:avLst/>
+          </a:prstGeom>
+          <a:solidFill>
+            <a:schemeClr val="bg1"/>
+          </a:solidFill>
+          <a:ln>
+            <a:solidFill>
+              <a:schemeClr val="tx1"/>
+            </a:solidFill>
+          </a:ln>
+        </p:spPr>
+        <p:txBody>
+          <a:bodyPr wrap="square" rtlCol="0">
+            <a:spAutoFit/>
+          </a:bodyPr>
+          <a:lstStyle/>
+          <a:p>
+            <a:pPr algn="ctr"/>
+            <a:r>
+              <a:rPr lang="en-US" sz="1100" i="1" dirty="0" smtClean="0"/>
+              <a:t>Read final dataset from file exchange &amp; build </a:t>
+            </a:r>
+            <a:r>
+              <a:rPr lang="en-US" sz="1100" i="1" dirty="0"/>
+              <a:t>prototype </a:t>
+            </a:r>
+            <a:r>
+              <a:rPr lang="en-US" sz="1100" i="1" dirty="0" smtClean="0"/>
+              <a:t>model on subset of the data</a:t>
+            </a:r>
+            <a:endParaRPr lang="en-US" sz="1100" i="1" dirty="0"/>
+          </a:p>
+        </p:txBody>
+      </p:sp>
+      <p:sp>
+        <p:nvSpPr>
+          <p:cNvPr id="60" name="TextBox 59"/>
+          <p:cNvSpPr txBox="1"/>
+          <p:nvPr/>
+        </p:nvSpPr>
+        <p:spPr>
+          <a:xfrm>
+            <a:off x="3645326" y="5794664"/>
+            <a:ext cx="5029200" cy="261610"/>
+          </a:xfrm>
+          <a:prstGeom prst="rect">
+            <a:avLst/>
+          </a:prstGeom>
+          <a:solidFill>
+            <a:schemeClr val="bg1"/>
+          </a:solidFill>
+          <a:ln>
+            <a:solidFill>
+              <a:schemeClr val="tx1"/>
+            </a:solidFill>
+          </a:ln>
+        </p:spPr>
+        <p:txBody>
+          <a:bodyPr wrap="square" rtlCol="0">
+            <a:spAutoFit/>
+          </a:bodyPr>
+          <a:lstStyle/>
+          <a:p>
+            <a:pPr algn="ctr"/>
+            <a:r>
+              <a:rPr lang="en-US" sz="1100" i="1" dirty="0" smtClean="0"/>
+              <a:t>Load final model results and data set; prepare tables and figures &amp; write paper</a:t>
+            </a:r>
+            <a:endParaRPr lang="en-US" sz="1100" i="1" dirty="0"/>
+          </a:p>
+        </p:txBody>
+      </p:sp>
+      <p:sp>
+        <p:nvSpPr>
+          <p:cNvPr id="68" name="TextBox 67"/>
+          <p:cNvSpPr txBox="1"/>
+          <p:nvPr/>
+        </p:nvSpPr>
+        <p:spPr>
+          <a:xfrm>
+            <a:off x="2445296" y="3268952"/>
+            <a:ext cx="971741" cy="230832"/>
+          </a:xfrm>
+          <a:prstGeom prst="rect">
+            <a:avLst/>
+          </a:prstGeom>
+          <a:noFill/>
+        </p:spPr>
+        <p:txBody>
+          <a:bodyPr wrap="none" rtlCol="0">
+            <a:spAutoFit/>
+          </a:bodyPr>
+          <a:lstStyle/>
+          <a:p>
+            <a:pPr algn="ctr"/>
+            <a:r>
+              <a:rPr lang="en-US" sz="900" i="1" dirty="0" smtClean="0"/>
+              <a:t>e.g</a:t>
+            </a:r>
+            <a:r>
+              <a:rPr lang="en-US" sz="900" i="1" dirty="0" smtClean="0"/>
+              <a:t>., workstation</a:t>
+            </a:r>
+            <a:endParaRPr lang="en-US" sz="1100" dirty="0"/>
+          </a:p>
+        </p:txBody>
+      </p:sp>
+      <p:sp>
+        <p:nvSpPr>
+          <p:cNvPr id="69" name="TextBox 68"/>
+          <p:cNvSpPr txBox="1"/>
+          <p:nvPr/>
+        </p:nvSpPr>
+        <p:spPr>
+          <a:xfrm>
+            <a:off x="2574338" y="4214893"/>
+            <a:ext cx="713657" cy="230832"/>
+          </a:xfrm>
+          <a:prstGeom prst="rect">
+            <a:avLst/>
+          </a:prstGeom>
+          <a:noFill/>
+        </p:spPr>
+        <p:txBody>
+          <a:bodyPr wrap="none" rtlCol="0">
+            <a:spAutoFit/>
+          </a:bodyPr>
+          <a:lstStyle/>
+          <a:p>
+            <a:pPr algn="ctr"/>
+            <a:r>
+              <a:rPr lang="en-US" sz="900" i="1" dirty="0" smtClean="0"/>
+              <a:t>e.g</a:t>
+            </a:r>
+            <a:r>
+              <a:rPr lang="en-US" sz="900" i="1" dirty="0" smtClean="0"/>
+              <a:t>., laptop</a:t>
+            </a:r>
+            <a:endParaRPr lang="en-US" sz="1100" dirty="0"/>
+          </a:p>
+        </p:txBody>
+      </p:sp>
+      <p:sp>
+        <p:nvSpPr>
+          <p:cNvPr id="70" name="TextBox 69"/>
+          <p:cNvSpPr txBox="1"/>
+          <p:nvPr/>
+        </p:nvSpPr>
+        <p:spPr>
+          <a:xfrm>
+            <a:off x="2390794" y="5160834"/>
+            <a:ext cx="1080745" cy="230832"/>
+          </a:xfrm>
+          <a:prstGeom prst="rect">
+            <a:avLst/>
+          </a:prstGeom>
+          <a:noFill/>
+        </p:spPr>
+        <p:txBody>
+          <a:bodyPr wrap="none" rtlCol="0">
+            <a:spAutoFit/>
+          </a:bodyPr>
+          <a:lstStyle/>
+          <a:p>
+            <a:pPr algn="ctr"/>
+            <a:r>
+              <a:rPr lang="en-US" sz="900" i="1" dirty="0" smtClean="0"/>
+              <a:t>e.g</a:t>
+            </a:r>
+            <a:r>
+              <a:rPr lang="en-US" sz="900" i="1" dirty="0" smtClean="0"/>
+              <a:t>., cloud instance</a:t>
+            </a:r>
+            <a:endParaRPr lang="en-US" sz="1100" dirty="0"/>
+          </a:p>
+        </p:txBody>
+      </p:sp>
+      <p:sp>
+        <p:nvSpPr>
+          <p:cNvPr id="71" name="TextBox 70"/>
+          <p:cNvSpPr txBox="1"/>
+          <p:nvPr/>
+        </p:nvSpPr>
+        <p:spPr>
+          <a:xfrm>
+            <a:off x="2574338" y="6106774"/>
+            <a:ext cx="713657" cy="230832"/>
+          </a:xfrm>
+          <a:prstGeom prst="rect">
+            <a:avLst/>
+          </a:prstGeom>
+          <a:noFill/>
+        </p:spPr>
+        <p:txBody>
+          <a:bodyPr wrap="none" rtlCol="0">
+            <a:spAutoFit/>
+          </a:bodyPr>
+          <a:lstStyle/>
+          <a:p>
+            <a:pPr algn="ctr"/>
+            <a:r>
+              <a:rPr lang="en-US" sz="900" i="1" dirty="0" smtClean="0"/>
+              <a:t>e.g</a:t>
+            </a:r>
+            <a:r>
+              <a:rPr lang="en-US" sz="900" i="1" dirty="0" smtClean="0"/>
+              <a:t>., laptop</a:t>
+            </a:r>
+            <a:endParaRPr lang="en-US" sz="1100" dirty="0"/>
+          </a:p>
+        </p:txBody>
+      </p:sp>
+    </p:spTree>
+    <p:extLst>
+      <p:ext uri="{BB962C8B-B14F-4D97-AF65-F5344CB8AC3E}">
+        <p14:creationId xmlns:p14="http://schemas.microsoft.com/office/powerpoint/2010/main" val="2922218065"/>
+      </p:ext>
+    </p:extLst>
+  </p:cSld>
+  <p:clrMapOvr>
+    <a:masterClrMapping/>
+  </p:clrMapOvr>
+</p:sld>
+</file>
+
+<file path=ppt/slides/slide3.xml><?xml version="1.0" encoding="utf-8"?>
+<p:sld xmlns:a="http://schemas.openxmlformats.org/drawingml/2006/main" xmlns:r="http://schemas.openxmlformats.org/officeDocument/2006/relationships" xmlns:p="http://schemas.openxmlformats.org/presentationml/2006/main">
+  <p:cSld>
+    <p:spTree>
+      <p:nvGrpSpPr>
+        <p:cNvPr id="1" name=""/>
+        <p:cNvGrpSpPr/>
+        <p:nvPr/>
+      </p:nvGrpSpPr>
+      <p:grpSpPr>
+        <a:xfrm>
+          <a:off x="0" y="0"/>
+          <a:ext cx="0" cy="0"/>
+          <a:chOff x="0" y="0"/>
+          <a:chExt cx="0" cy="0"/>
+        </a:xfrm>
+      </p:grpSpPr>
+      <p:cxnSp>
+        <p:nvCxnSpPr>
+          <p:cNvPr id="46" name="Curved Connector 45"/>
+          <p:cNvCxnSpPr/>
+          <p:nvPr/>
+        </p:nvCxnSpPr>
+        <p:spPr>
+          <a:xfrm rot="16200000" flipH="1">
+            <a:off x="4405582" y="3218792"/>
+            <a:ext cx="2813095" cy="917402"/>
+          </a:xfrm>
+          <a:prstGeom prst="curvedConnector3">
+            <a:avLst>
+              <a:gd name="adj1" fmla="val 50000"/>
+            </a:avLst>
+          </a:prstGeom>
+          <a:ln>
+            <a:solidFill>
+              <a:schemeClr val="accent4">
+                <a:lumMod val="75000"/>
+              </a:schemeClr>
+            </a:solidFill>
+            <a:tailEnd type="triangle"/>
+          </a:ln>
+        </p:spPr>
+        <p:style>
+          <a:lnRef idx="1">
+            <a:schemeClr val="accent2"/>
+          </a:lnRef>
+          <a:fillRef idx="0">
+            <a:schemeClr val="accent2"/>
+          </a:fillRef>
+          <a:effectRef idx="0">
+            <a:schemeClr val="accent2"/>
+          </a:effectRef>
+          <a:fontRef idx="minor">
+            <a:schemeClr val="tx1"/>
+          </a:fontRef>
+        </p:style>
+      </p:cxnSp>
+      <p:sp>
+        <p:nvSpPr>
+          <p:cNvPr id="6" name="TextBox 5"/>
+          <p:cNvSpPr txBox="1"/>
+          <p:nvPr/>
+        </p:nvSpPr>
+        <p:spPr>
+          <a:xfrm>
+            <a:off x="3304180" y="772166"/>
+            <a:ext cx="1083951" cy="677108"/>
+          </a:xfrm>
+          <a:prstGeom prst="rect">
+            <a:avLst/>
+          </a:prstGeom>
+          <a:solidFill>
+            <a:schemeClr val="bg1"/>
+          </a:solidFill>
+        </p:spPr>
+        <p:txBody>
+          <a:bodyPr wrap="none" rtlCol="0">
+            <a:spAutoFit/>
+          </a:bodyPr>
+          <a:lstStyle/>
+          <a:p>
+            <a:r>
+              <a:rPr lang="en-US" sz="1100" b="1" dirty="0" smtClean="0"/>
+              <a:t>Raw data</a:t>
+            </a:r>
+            <a:r>
+              <a:rPr lang="en-US" sz="1100" b="1" dirty="0"/>
+              <a:t/>
+            </a:r>
+            <a:br>
+              <a:rPr lang="en-US" sz="1100" b="1" dirty="0"/>
+            </a:br>
+            <a:r>
+              <a:rPr lang="en-US" sz="900" i="1" dirty="0" smtClean="0"/>
+              <a:t>e.g</a:t>
+            </a:r>
+            <a:r>
+              <a:rPr lang="en-US" sz="900" i="1" dirty="0" smtClean="0"/>
+              <a:t>., files </a:t>
+            </a:r>
+            <a:r>
+              <a:rPr lang="en-US" sz="900" i="1" dirty="0" smtClean="0"/>
+              <a:t>on server</a:t>
+            </a:r>
+            <a:r>
+              <a:rPr lang="en-US" sz="900" i="1" dirty="0" smtClean="0"/>
+              <a:t>,</a:t>
+            </a:r>
+            <a:br>
+              <a:rPr lang="en-US" sz="900" i="1" dirty="0" smtClean="0"/>
+            </a:br>
+            <a:r>
+              <a:rPr lang="en-US" sz="900" i="1" dirty="0" smtClean="0"/>
+              <a:t>or in a database;</a:t>
+            </a:r>
+            <a:endParaRPr lang="en-US" sz="900" i="1" dirty="0"/>
+          </a:p>
+          <a:p>
+            <a:r>
+              <a:rPr lang="en-US" sz="900" i="1" dirty="0"/>
+              <a:t>regular backups</a:t>
+            </a:r>
+            <a:endParaRPr lang="en-US" sz="1100" dirty="0"/>
+          </a:p>
+        </p:txBody>
+      </p:sp>
+      <p:pic>
+        <p:nvPicPr>
+          <p:cNvPr id="4" name="Picture 3"/>
+          <p:cNvPicPr>
+            <a:picLocks noChangeAspect="1"/>
+          </p:cNvPicPr>
+          <p:nvPr/>
+        </p:nvPicPr>
+        <p:blipFill>
+          <a:blip r:embed="rId2" cstate="print">
+            <a:extLst>
+              <a:ext uri="{28A0092B-C50C-407E-A947-70E740481C1C}">
+                <a14:useLocalDpi xmlns:a14="http://schemas.microsoft.com/office/drawing/2010/main" val="0"/>
+              </a:ext>
+            </a:extLst>
+          </a:blip>
+          <a:stretch>
+            <a:fillRect/>
+          </a:stretch>
+        </p:blipFill>
+        <p:spPr>
+          <a:xfrm>
+            <a:off x="3508943" y="1618961"/>
+            <a:ext cx="687754" cy="687754"/>
+          </a:xfrm>
+          <a:prstGeom prst="rect">
+            <a:avLst/>
+          </a:prstGeom>
+        </p:spPr>
+      </p:pic>
+      <p:pic>
+        <p:nvPicPr>
+          <p:cNvPr id="7" name="Picture 6"/>
+          <p:cNvPicPr>
+            <a:picLocks noChangeAspect="1"/>
+          </p:cNvPicPr>
+          <p:nvPr/>
+        </p:nvPicPr>
+        <p:blipFill>
+          <a:blip r:embed="rId3" cstate="print">
+            <a:extLst>
+              <a:ext uri="{28A0092B-C50C-407E-A947-70E740481C1C}">
+                <a14:useLocalDpi xmlns:a14="http://schemas.microsoft.com/office/drawing/2010/main" val="0"/>
+              </a:ext>
+            </a:extLst>
+          </a:blip>
+          <a:stretch>
+            <a:fillRect/>
+          </a:stretch>
+        </p:blipFill>
+        <p:spPr>
+          <a:xfrm>
+            <a:off x="4916422" y="1620915"/>
+            <a:ext cx="685800" cy="685800"/>
+          </a:xfrm>
+          <a:prstGeom prst="rect">
+            <a:avLst/>
+          </a:prstGeom>
+        </p:spPr>
+      </p:pic>
+      <p:sp>
+        <p:nvSpPr>
+          <p:cNvPr id="9" name="TextBox 8"/>
+          <p:cNvSpPr txBox="1"/>
+          <p:nvPr/>
+        </p:nvSpPr>
+        <p:spPr>
+          <a:xfrm>
+            <a:off x="4710682" y="772166"/>
+            <a:ext cx="1097280" cy="677108"/>
+          </a:xfrm>
+          <a:prstGeom prst="rect">
+            <a:avLst/>
+          </a:prstGeom>
+          <a:solidFill>
+            <a:schemeClr val="bg1"/>
+          </a:solidFill>
+        </p:spPr>
+        <p:txBody>
+          <a:bodyPr wrap="none" rtlCol="0">
+            <a:spAutoFit/>
+          </a:bodyPr>
+          <a:lstStyle/>
+          <a:p>
+            <a:r>
+              <a:rPr lang="en-US" sz="1100" b="1" dirty="0" smtClean="0"/>
+              <a:t>Source code</a:t>
+            </a:r>
+            <a:r>
+              <a:rPr lang="en-US" sz="1100" b="1" dirty="0"/>
+              <a:t/>
+            </a:r>
+            <a:br>
+              <a:rPr lang="en-US" sz="1100" b="1" dirty="0"/>
+            </a:br>
+            <a:r>
+              <a:rPr lang="en-US" sz="900" i="1" dirty="0"/>
+              <a:t>versioned, </a:t>
+            </a:r>
+            <a:br>
+              <a:rPr lang="en-US" sz="900" i="1" dirty="0"/>
+            </a:br>
+            <a:r>
+              <a:rPr lang="en-US" sz="900" i="1" dirty="0"/>
+              <a:t>e.g., on </a:t>
+            </a:r>
+            <a:r>
+              <a:rPr lang="en-US" sz="900" i="1" dirty="0" err="1"/>
+              <a:t>Git</a:t>
+            </a:r>
+            <a:r>
+              <a:rPr lang="en-US" sz="900" i="1" dirty="0"/>
+              <a:t>,</a:t>
+            </a:r>
+            <a:br>
+              <a:rPr lang="en-US" sz="900" i="1" dirty="0"/>
+            </a:br>
+            <a:r>
+              <a:rPr lang="en-US" sz="900" i="1" dirty="0"/>
+              <a:t>automatic backups</a:t>
+            </a:r>
+            <a:endParaRPr lang="en-US" sz="1600" b="1" dirty="0"/>
+          </a:p>
+        </p:txBody>
+      </p:sp>
+      <p:sp>
+        <p:nvSpPr>
+          <p:cNvPr id="11" name="TextBox 10"/>
+          <p:cNvSpPr txBox="1"/>
+          <p:nvPr/>
+        </p:nvSpPr>
+        <p:spPr>
+          <a:xfrm>
+            <a:off x="1962434" y="2679304"/>
+            <a:ext cx="1189749" cy="261610"/>
+          </a:xfrm>
+          <a:prstGeom prst="rect">
+            <a:avLst/>
+          </a:prstGeom>
+          <a:solidFill>
+            <a:schemeClr val="bg1"/>
+          </a:solidFill>
+        </p:spPr>
+        <p:txBody>
+          <a:bodyPr wrap="none" rtlCol="0">
+            <a:spAutoFit/>
+          </a:bodyPr>
+          <a:lstStyle/>
+          <a:p>
+            <a:r>
+              <a:rPr lang="en-US" sz="1100" b="1" dirty="0"/>
+              <a:t>Local computer 1</a:t>
+            </a:r>
+          </a:p>
+        </p:txBody>
+      </p:sp>
+      <p:pic>
+        <p:nvPicPr>
+          <p:cNvPr id="14" name="Picture 13"/>
+          <p:cNvPicPr>
+            <a:picLocks noChangeAspect="1"/>
+          </p:cNvPicPr>
+          <p:nvPr/>
+        </p:nvPicPr>
+        <p:blipFill>
+          <a:blip r:embed="rId4" cstate="print">
+            <a:extLst>
+              <a:ext uri="{28A0092B-C50C-407E-A947-70E740481C1C}">
+                <a14:useLocalDpi xmlns:a14="http://schemas.microsoft.com/office/drawing/2010/main" val="0"/>
+              </a:ext>
+            </a:extLst>
+          </a:blip>
+          <a:stretch>
+            <a:fillRect/>
+          </a:stretch>
+        </p:blipFill>
+        <p:spPr>
+          <a:xfrm flipH="1">
+            <a:off x="2214408" y="2815950"/>
+            <a:ext cx="685800" cy="685800"/>
+          </a:xfrm>
+          <a:prstGeom prst="rect">
+            <a:avLst/>
+          </a:prstGeom>
+        </p:spPr>
+      </p:pic>
+      <p:sp>
+        <p:nvSpPr>
+          <p:cNvPr id="15" name="TextBox 14"/>
+          <p:cNvSpPr txBox="1"/>
+          <p:nvPr/>
+        </p:nvSpPr>
+        <p:spPr>
+          <a:xfrm>
+            <a:off x="2017615" y="3800175"/>
+            <a:ext cx="1189749" cy="261610"/>
+          </a:xfrm>
+          <a:prstGeom prst="rect">
+            <a:avLst/>
+          </a:prstGeom>
+          <a:solidFill>
+            <a:schemeClr val="bg1"/>
+          </a:solidFill>
+        </p:spPr>
+        <p:txBody>
+          <a:bodyPr wrap="none" rtlCol="0">
+            <a:spAutoFit/>
+          </a:bodyPr>
+          <a:lstStyle/>
+          <a:p>
+            <a:r>
+              <a:rPr lang="en-US" sz="1100" b="1" dirty="0"/>
+              <a:t>Local computer 2</a:t>
+            </a:r>
+          </a:p>
+        </p:txBody>
+      </p:sp>
+      <p:pic>
+        <p:nvPicPr>
+          <p:cNvPr id="17" name="Picture 16"/>
+          <p:cNvPicPr>
+            <a:picLocks noChangeAspect="1"/>
+          </p:cNvPicPr>
+          <p:nvPr/>
+        </p:nvPicPr>
+        <p:blipFill>
+          <a:blip r:embed="rId5" cstate="print">
+            <a:extLst>
+              <a:ext uri="{28A0092B-C50C-407E-A947-70E740481C1C}">
+                <a14:useLocalDpi xmlns:a14="http://schemas.microsoft.com/office/drawing/2010/main" val="0"/>
+              </a:ext>
+            </a:extLst>
+          </a:blip>
+          <a:stretch>
+            <a:fillRect/>
+          </a:stretch>
+        </p:blipFill>
+        <p:spPr>
+          <a:xfrm>
+            <a:off x="2269589" y="3930980"/>
+            <a:ext cx="685800" cy="685800"/>
+          </a:xfrm>
+          <a:prstGeom prst="rect">
+            <a:avLst/>
+          </a:prstGeom>
+        </p:spPr>
+      </p:pic>
+      <p:sp>
+        <p:nvSpPr>
+          <p:cNvPr id="20" name="TextBox 19"/>
+          <p:cNvSpPr txBox="1"/>
+          <p:nvPr/>
+        </p:nvSpPr>
+        <p:spPr>
+          <a:xfrm>
+            <a:off x="7523686" y="772166"/>
+            <a:ext cx="1281120" cy="954107"/>
+          </a:xfrm>
+          <a:prstGeom prst="rect">
+            <a:avLst/>
+          </a:prstGeom>
+          <a:solidFill>
+            <a:schemeClr val="bg1"/>
+          </a:solidFill>
+        </p:spPr>
+        <p:txBody>
+          <a:bodyPr wrap="none" rtlCol="0">
+            <a:spAutoFit/>
+          </a:bodyPr>
+          <a:lstStyle/>
+          <a:p>
+            <a:r>
+              <a:rPr lang="en-US" sz="1100" b="1" dirty="0" smtClean="0"/>
+              <a:t>File exchange</a:t>
+            </a:r>
+            <a:r>
+              <a:rPr lang="en-US" sz="1100" b="1" dirty="0"/>
+              <a:t/>
+            </a:r>
+            <a:br>
+              <a:rPr lang="en-US" sz="1100" b="1" dirty="0"/>
+            </a:br>
+            <a:r>
+              <a:rPr lang="en-US" sz="900" i="1" dirty="0"/>
+              <a:t>e.g., on temporary file </a:t>
+            </a:r>
+            <a:br>
+              <a:rPr lang="en-US" sz="900" i="1" dirty="0"/>
+            </a:br>
+            <a:r>
+              <a:rPr lang="en-US" sz="900" i="1" dirty="0"/>
+              <a:t>share (like S3); used to </a:t>
+            </a:r>
+            <a:br>
+              <a:rPr lang="en-US" sz="900" i="1" dirty="0"/>
+            </a:br>
+            <a:r>
+              <a:rPr lang="en-US" sz="900" i="1" dirty="0"/>
+              <a:t>pass pre-builds of </a:t>
+            </a:r>
+            <a:br>
+              <a:rPr lang="en-US" sz="900" i="1" dirty="0"/>
+            </a:br>
+            <a:r>
+              <a:rPr lang="en-US" sz="900" i="1" dirty="0"/>
+              <a:t>projects to later stages,</a:t>
+            </a:r>
+            <a:br>
+              <a:rPr lang="en-US" sz="900" i="1" dirty="0"/>
+            </a:br>
+            <a:r>
+              <a:rPr lang="en-US" sz="900" i="1" dirty="0"/>
+              <a:t>no backups</a:t>
+            </a:r>
+            <a:endParaRPr lang="en-US" sz="1100" b="1" i="1" dirty="0"/>
+          </a:p>
+        </p:txBody>
+      </p:sp>
+      <p:pic>
+        <p:nvPicPr>
+          <p:cNvPr id="22" name="Picture 21"/>
+          <p:cNvPicPr>
+            <a:picLocks noChangeAspect="1"/>
+          </p:cNvPicPr>
+          <p:nvPr/>
+        </p:nvPicPr>
+        <p:blipFill>
+          <a:blip r:embed="rId6" cstate="print">
+            <a:extLst>
+              <a:ext uri="{28A0092B-C50C-407E-A947-70E740481C1C}">
+                <a14:useLocalDpi xmlns:a14="http://schemas.microsoft.com/office/drawing/2010/main" val="0"/>
+              </a:ext>
+            </a:extLst>
+          </a:blip>
+          <a:stretch>
+            <a:fillRect/>
+          </a:stretch>
+        </p:blipFill>
+        <p:spPr>
+          <a:xfrm>
+            <a:off x="6322924" y="1620915"/>
+            <a:ext cx="685800" cy="685800"/>
+          </a:xfrm>
+          <a:prstGeom prst="rect">
+            <a:avLst/>
+          </a:prstGeom>
+        </p:spPr>
+      </p:pic>
+      <p:sp>
+        <p:nvSpPr>
+          <p:cNvPr id="23" name="TextBox 22"/>
+          <p:cNvSpPr txBox="1"/>
+          <p:nvPr/>
+        </p:nvSpPr>
+        <p:spPr>
+          <a:xfrm>
+            <a:off x="2106704" y="4777229"/>
+            <a:ext cx="1045479" cy="261610"/>
+          </a:xfrm>
+          <a:prstGeom prst="rect">
+            <a:avLst/>
+          </a:prstGeom>
+          <a:solidFill>
+            <a:schemeClr val="bg1"/>
+          </a:solidFill>
+        </p:spPr>
+        <p:txBody>
+          <a:bodyPr wrap="none" rtlCol="0">
+            <a:spAutoFit/>
+          </a:bodyPr>
+          <a:lstStyle/>
+          <a:p>
+            <a:r>
+              <a:rPr lang="en-US" sz="1100" b="1" dirty="0"/>
+              <a:t>Cloud Instance</a:t>
+            </a:r>
+          </a:p>
+        </p:txBody>
+      </p:sp>
+      <p:pic>
+        <p:nvPicPr>
+          <p:cNvPr id="25" name="Picture 24"/>
+          <p:cNvPicPr>
+            <a:picLocks noChangeAspect="1"/>
+          </p:cNvPicPr>
+          <p:nvPr/>
+        </p:nvPicPr>
+        <p:blipFill>
+          <a:blip r:embed="rId7" cstate="print">
+            <a:extLst>
+              <a:ext uri="{28A0092B-C50C-407E-A947-70E740481C1C}">
+                <a14:useLocalDpi xmlns:a14="http://schemas.microsoft.com/office/drawing/2010/main" val="0"/>
+              </a:ext>
+            </a:extLst>
+          </a:blip>
+          <a:stretch>
+            <a:fillRect/>
+          </a:stretch>
+        </p:blipFill>
+        <p:spPr>
+          <a:xfrm>
+            <a:off x="2286543" y="4909529"/>
+            <a:ext cx="685800" cy="685800"/>
+          </a:xfrm>
+          <a:prstGeom prst="rect">
+            <a:avLst/>
+          </a:prstGeom>
+        </p:spPr>
+      </p:pic>
+      <p:sp>
+        <p:nvSpPr>
+          <p:cNvPr id="26" name="Rectangle 25"/>
+          <p:cNvSpPr/>
+          <p:nvPr/>
+        </p:nvSpPr>
+        <p:spPr>
+          <a:xfrm rot="5400000">
+            <a:off x="6743285" y="-3101813"/>
+            <a:ext cx="261993" cy="7333842"/>
+          </a:xfrm>
+          <a:prstGeom prst="rect">
+            <a:avLst/>
+          </a:prstGeom>
+          <a:solidFill>
+            <a:schemeClr val="accent1"/>
+          </a:solidFill>
+          <a:ln>
+            <a:solidFill>
+              <a:schemeClr val="tx1"/>
+            </a:solidFill>
+          </a:ln>
+        </p:spPr>
+        <p:style>
+          <a:lnRef idx="2">
+            <a:schemeClr val="accent1">
+              <a:shade val="50000"/>
+            </a:schemeClr>
+          </a:lnRef>
+          <a:fillRef idx="1">
+            <a:schemeClr val="accent1"/>
+          </a:fillRef>
+          <a:effectRef idx="0">
+            <a:schemeClr val="accent1"/>
+          </a:effectRef>
+          <a:fontRef idx="minor">
+            <a:schemeClr val="lt1"/>
+          </a:fontRef>
+        </p:style>
+        <p:txBody>
+          <a:bodyPr vert="vert270" rtlCol="0" anchor="ctr"/>
+          <a:lstStyle/>
+          <a:p>
+            <a:pPr algn="ctr"/>
+            <a:r>
+              <a:rPr lang="en-US" sz="1600" dirty="0">
+                <a:solidFill>
+                  <a:schemeClr val="bg1"/>
+                </a:solidFill>
+              </a:rPr>
+              <a:t>Project components</a:t>
+            </a:r>
+          </a:p>
+        </p:txBody>
+      </p:sp>
+      <p:sp>
+        <p:nvSpPr>
+          <p:cNvPr id="27" name="Rectangle 26"/>
+          <p:cNvSpPr/>
+          <p:nvPr/>
+        </p:nvSpPr>
+        <p:spPr>
+          <a:xfrm>
+            <a:off x="1534578" y="2463210"/>
+            <a:ext cx="279812" cy="3248608"/>
+          </a:xfrm>
+          <a:prstGeom prst="rect">
+            <a:avLst/>
+          </a:prstGeom>
+          <a:solidFill>
+            <a:schemeClr val="accent1"/>
+          </a:solidFill>
+          <a:ln>
+            <a:solidFill>
+              <a:schemeClr val="tx1"/>
+            </a:solidFill>
+          </a:ln>
+        </p:spPr>
+        <p:style>
+          <a:lnRef idx="2">
+            <a:schemeClr val="accent1">
+              <a:shade val="50000"/>
+            </a:schemeClr>
+          </a:lnRef>
+          <a:fillRef idx="1">
+            <a:schemeClr val="accent1"/>
+          </a:fillRef>
+          <a:effectRef idx="0">
+            <a:schemeClr val="accent1"/>
+          </a:effectRef>
+          <a:fontRef idx="minor">
+            <a:schemeClr val="lt1"/>
+          </a:fontRef>
+        </p:style>
+        <p:txBody>
+          <a:bodyPr vert="vert270" rtlCol="0" anchor="ctr"/>
+          <a:lstStyle/>
+          <a:p>
+            <a:pPr algn="ctr"/>
+            <a:r>
+              <a:rPr lang="en-US" sz="1600" dirty="0">
+                <a:solidFill>
+                  <a:schemeClr val="bg1"/>
+                </a:solidFill>
+              </a:rPr>
               <a:t>Project builds</a:t>
             </a:r>
           </a:p>
@@ -3621,12 +5251,12 @@
         </p:nvCxnSpPr>
         <p:spPr>
           <a:xfrm rot="5400000">
-            <a:off x="4497247" y="2448076"/>
-            <a:ext cx="658678" cy="326999"/>
+            <a:off x="4718071" y="2466014"/>
+            <a:ext cx="614792" cy="263964"/>
           </a:xfrm>
           <a:prstGeom prst="curvedConnector3">
             <a:avLst>
-              <a:gd name="adj1" fmla="val 51446"/>
+              <a:gd name="adj1" fmla="val 50000"/>
             </a:avLst>
           </a:prstGeom>
           <a:ln>
@@ -3663,9 +5293,9 @@
           <p:nvPr/>
         </p:nvCxnSpPr>
         <p:spPr>
-          <a:xfrm flipH="1">
-            <a:off x="3662515" y="2292346"/>
-            <a:ext cx="543" cy="669929"/>
+          <a:xfrm>
+            <a:off x="3852820" y="2306715"/>
+            <a:ext cx="0" cy="634199"/>
           </a:xfrm>
           <a:prstGeom prst="straightConnector1">
             <a:avLst/>
@@ -3744,7 +5374,7 @@
         </p:nvCxnSpPr>
         <p:spPr>
           <a:xfrm rot="16200000" flipH="1">
-            <a:off x="4356266" y="3016737"/>
+            <a:off x="4523629" y="3025100"/>
             <a:ext cx="1723663" cy="232079"/>
           </a:xfrm>
           <a:prstGeom prst="curvedConnector3">
@@ -3823,12 +5453,12 @@
         </p:nvCxnSpPr>
         <p:spPr>
           <a:xfrm flipV="1">
-            <a:off x="5341295" y="2234403"/>
-            <a:ext cx="974894" cy="670987"/>
+            <a:off x="5269421" y="2237805"/>
+            <a:ext cx="1296489" cy="667587"/>
           </a:xfrm>
           <a:prstGeom prst="curvedConnector3">
             <a:avLst>
-              <a:gd name="adj1" fmla="val 472"/>
+              <a:gd name="adj1" fmla="val 50000"/>
             </a:avLst>
           </a:prstGeom>
           <a:ln>
@@ -3837,6 +5467,7 @@
                 <a:lumMod val="50000"/>
               </a:schemeClr>
             </a:solidFill>
+            <a:headEnd type="triangle"/>
             <a:tailEnd type="triangle"/>
           </a:ln>
         </p:spPr>
@@ -3991,8 +5622,8 @@
         </p:blipFill>
         <p:spPr>
           <a:xfrm>
-            <a:off x="9165583" y="1614228"/>
-            <a:ext cx="648355" cy="648355"/>
+            <a:off x="9135929" y="1620915"/>
+            <a:ext cx="685800" cy="685800"/>
           </a:xfrm>
           <a:prstGeom prst="rect">
             <a:avLst/>
@@ -4008,7 +5639,7 @@
         <p:spPr>
           <a:xfrm>
             <a:off x="8930189" y="772166"/>
-            <a:ext cx="1611015" cy="815608"/>
+            <a:ext cx="1097280" cy="815608"/>
           </a:xfrm>
           <a:prstGeom prst="rect">
             <a:avLst/>
@@ -4032,14 +5663,23 @@
             </a:br>
             <a:r>
               <a:rPr lang="en-US" sz="900" i="1" dirty="0"/>
-              <a:t>e.g., meeting notes, literature: keep on easily accessible cloud</a:t>
-            </a:r>
-            <a:br>
+              <a:t>e.g., meeting notes, </a:t>
+            </a:r>
+            <a:r>
+              <a:rPr lang="en-US" sz="900" i="1" dirty="0" smtClean="0"/>
+              <a:t>literature: </a:t>
+            </a:r>
+            <a:r>
               <a:rPr lang="en-US" sz="900" i="1" dirty="0"/>
-            </a:br>
+              <a:t>keep on </a:t>
+            </a:r>
+            <a:r>
+              <a:rPr lang="en-US" sz="900" i="1" dirty="0" smtClean="0"/>
+              <a:t>cloud like Dropbox,</a:t>
+            </a:r>
             <a:r>
               <a:rPr lang="en-US" sz="900" i="1" dirty="0"/>
-              <a:t>like Dropbox or Google Drive,</a:t>
+              <a:t/>
             </a:r>
             <a:br>
               <a:rPr lang="en-US" sz="900" i="1" dirty="0"/>
@@ -4066,7 +5706,7 @@
         </p:nvSpPr>
         <p:spPr>
           <a:xfrm>
-            <a:off x="5989182" y="798054"/>
+            <a:off x="6117184" y="772166"/>
             <a:ext cx="1215397" cy="815608"/>
           </a:xfrm>
           <a:prstGeom prst="rect">
@@ -4083,8 +5723,12 @@
           <a:lstStyle/>
           <a:p>
             <a:r>
+              <a:rPr lang="en-US" sz="1100" b="1" dirty="0" smtClean="0"/>
+              <a:t>Generated temp</a:t>
+            </a:r>
+            <a:r>
               <a:rPr lang="en-US" sz="1100" b="1" dirty="0"/>
-              <a:t>Generated</a:t>
+              <a:t/>
             </a:r>
             <a:br>
               <a:rPr lang="en-US" sz="1100" b="1" dirty="0"/>
@@ -4118,6 +5762,77 @@
           </a:p>
         </p:txBody>
       </p:sp>
+      <p:pic>
+        <p:nvPicPr>
+          <p:cNvPr id="3" name="Picture 2"/>
+          <p:cNvPicPr>
+            <a:picLocks noChangeAspect="1"/>
+          </p:cNvPicPr>
+          <p:nvPr/>
+        </p:nvPicPr>
+        <p:blipFill>
+          <a:blip r:embed="rId9" cstate="print">
+            <a:extLst>
+              <a:ext uri="{28A0092B-C50C-407E-A947-70E740481C1C}">
+                <a14:useLocalDpi xmlns:a14="http://schemas.microsoft.com/office/drawing/2010/main" val="0"/>
+              </a:ext>
+            </a:extLst>
+          </a:blip>
+          <a:stretch>
+            <a:fillRect/>
+          </a:stretch>
+        </p:blipFill>
+        <p:spPr>
+          <a:xfrm>
+            <a:off x="7821346" y="1620915"/>
+            <a:ext cx="685800" cy="685800"/>
+          </a:xfrm>
+          <a:prstGeom prst="rect">
+            <a:avLst/>
+          </a:prstGeom>
+        </p:spPr>
+      </p:pic>
+      <p:cxnSp>
+        <p:nvCxnSpPr>
+          <p:cNvPr id="39" name="Curved Connector 38"/>
+          <p:cNvCxnSpPr>
+            <a:endCxn id="3" idx="2"/>
+          </p:cNvCxnSpPr>
+          <p:nvPr/>
+        </p:nvCxnSpPr>
+        <p:spPr>
+          <a:xfrm flipV="1">
+            <a:off x="5482038" y="2306715"/>
+            <a:ext cx="2682208" cy="601256"/>
+          </a:xfrm>
+          <a:prstGeom prst="curvedConnector2">
+            <a:avLst/>
+          </a:prstGeom>
+          <a:ln>
+            <a:solidFill>
+              <a:schemeClr val="accent2">
+                <a:lumMod val="50000"/>
+              </a:schemeClr>
+            </a:solidFill>
+            <a:headEnd type="none"/>
+            <a:tailEnd type="triangle"/>
+          </a:ln>
+        </p:spPr>
+        <p:style>
+          <a:lnRef idx="1">
+            <a:schemeClr val="accent1"/>
+          </a:lnRef>
+          <a:fillRef idx="0">
+            <a:schemeClr val="accent1"/>
+          </a:fillRef>
+          <a:effectRef idx="0">
+            <a:schemeClr val="accent1"/>
+          </a:effectRef>
+          <a:fontRef idx="minor">
+            <a:schemeClr val="tx1"/>
+          </a:fontRef>
+        </p:style>
+      </p:cxnSp>
     </p:spTree>
     <p:extLst>
       <p:ext uri="{BB962C8B-B14F-4D97-AF65-F5344CB8AC3E}">

</xml_diff>

<commit_message>
improve make/automation (clarity), make check list in sync with rest of the material
</commit_message>
<xml_diff>
--- a/docs/workflow/figures_new.pptx
+++ b/docs/workflow/figures_new.pptx
@@ -7,7 +7,8 @@
   <p:sldIdLst>
     <p:sldId id="256" r:id="rId2"/>
     <p:sldId id="258" r:id="rId3"/>
-    <p:sldId id="257" r:id="rId4"/>
+    <p:sldId id="259" r:id="rId4"/>
+    <p:sldId id="257" r:id="rId5"/>
   </p:sldIdLst>
   <p:sldSz cx="12192000" cy="6858000"/>
   <p:notesSz cx="6858000" cy="9144000"/>
@@ -243,7 +244,7 @@
           <a:p>
             <a:fld id="{88284623-0E0D-4847-B04C-72246EF8BFFA}" type="datetimeFigureOut">
               <a:rPr lang="en-US" smtClean="0"/>
-              <a:t>2/18/2020</a:t>
+              <a:t>3/2/2020</a:t>
             </a:fld>
             <a:endParaRPr lang="en-US"/>
           </a:p>
@@ -411,7 +412,7 @@
           <a:p>
             <a:fld id="{88284623-0E0D-4847-B04C-72246EF8BFFA}" type="datetimeFigureOut">
               <a:rPr lang="en-US" smtClean="0"/>
-              <a:t>2/18/2020</a:t>
+              <a:t>3/2/2020</a:t>
             </a:fld>
             <a:endParaRPr lang="en-US"/>
           </a:p>
@@ -589,7 +590,7 @@
           <a:p>
             <a:fld id="{88284623-0E0D-4847-B04C-72246EF8BFFA}" type="datetimeFigureOut">
               <a:rPr lang="en-US" smtClean="0"/>
-              <a:t>2/18/2020</a:t>
+              <a:t>3/2/2020</a:t>
             </a:fld>
             <a:endParaRPr lang="en-US"/>
           </a:p>
@@ -757,7 +758,7 @@
           <a:p>
             <a:fld id="{88284623-0E0D-4847-B04C-72246EF8BFFA}" type="datetimeFigureOut">
               <a:rPr lang="en-US" smtClean="0"/>
-              <a:t>2/18/2020</a:t>
+              <a:t>3/2/2020</a:t>
             </a:fld>
             <a:endParaRPr lang="en-US"/>
           </a:p>
@@ -1002,7 +1003,7 @@
           <a:p>
             <a:fld id="{88284623-0E0D-4847-B04C-72246EF8BFFA}" type="datetimeFigureOut">
               <a:rPr lang="en-US" smtClean="0"/>
-              <a:t>2/18/2020</a:t>
+              <a:t>3/2/2020</a:t>
             </a:fld>
             <a:endParaRPr lang="en-US"/>
           </a:p>
@@ -1231,7 +1232,7 @@
           <a:p>
             <a:fld id="{88284623-0E0D-4847-B04C-72246EF8BFFA}" type="datetimeFigureOut">
               <a:rPr lang="en-US" smtClean="0"/>
-              <a:t>2/18/2020</a:t>
+              <a:t>3/2/2020</a:t>
             </a:fld>
             <a:endParaRPr lang="en-US"/>
           </a:p>
@@ -1595,7 +1596,7 @@
           <a:p>
             <a:fld id="{88284623-0E0D-4847-B04C-72246EF8BFFA}" type="datetimeFigureOut">
               <a:rPr lang="en-US" smtClean="0"/>
-              <a:t>2/18/2020</a:t>
+              <a:t>3/2/2020</a:t>
             </a:fld>
             <a:endParaRPr lang="en-US"/>
           </a:p>
@@ -1712,7 +1713,7 @@
           <a:p>
             <a:fld id="{88284623-0E0D-4847-B04C-72246EF8BFFA}" type="datetimeFigureOut">
               <a:rPr lang="en-US" smtClean="0"/>
-              <a:t>2/18/2020</a:t>
+              <a:t>3/2/2020</a:t>
             </a:fld>
             <a:endParaRPr lang="en-US"/>
           </a:p>
@@ -1807,7 +1808,7 @@
           <a:p>
             <a:fld id="{88284623-0E0D-4847-B04C-72246EF8BFFA}" type="datetimeFigureOut">
               <a:rPr lang="en-US" smtClean="0"/>
-              <a:t>2/18/2020</a:t>
+              <a:t>3/2/2020</a:t>
             </a:fld>
             <a:endParaRPr lang="en-US"/>
           </a:p>
@@ -2082,7 +2083,7 @@
           <a:p>
             <a:fld id="{88284623-0E0D-4847-B04C-72246EF8BFFA}" type="datetimeFigureOut">
               <a:rPr lang="en-US" smtClean="0"/>
-              <a:t>2/18/2020</a:t>
+              <a:t>3/2/2020</a:t>
             </a:fld>
             <a:endParaRPr lang="en-US"/>
           </a:p>
@@ -2334,7 +2335,7 @@
           <a:p>
             <a:fld id="{88284623-0E0D-4847-B04C-72246EF8BFFA}" type="datetimeFigureOut">
               <a:rPr lang="en-US" smtClean="0"/>
-              <a:t>2/18/2020</a:t>
+              <a:t>3/2/2020</a:t>
             </a:fld>
             <a:endParaRPr lang="en-US"/>
           </a:p>
@@ -2545,7 +2546,7 @@
           <a:p>
             <a:fld id="{88284623-0E0D-4847-B04C-72246EF8BFFA}" type="datetimeFigureOut">
               <a:rPr lang="en-US" smtClean="0"/>
-              <a:t>2/18/2020</a:t>
+              <a:t>3/2/2020</a:t>
             </a:fld>
             <a:endParaRPr lang="en-US"/>
           </a:p>
@@ -3041,40 +3042,23 @@
           <a:lstStyle/>
           <a:p>
             <a:r>
-              <a:rPr lang="en-US" sz="1100" b="1" dirty="0" smtClean="0"/>
+              <a:rPr lang="en-US" sz="1100" b="1" dirty="0"/>
               <a:t>Raw data</a:t>
-            </a:r>
-            <a:r>
-              <a:rPr lang="en-US" sz="1100" b="1" dirty="0"/>
-              <a:t/>
             </a:r>
             <a:br>
               <a:rPr lang="en-US" sz="1100" b="1" dirty="0"/>
             </a:br>
             <a:r>
-              <a:rPr lang="en-US" sz="900" i="1" dirty="0" smtClean="0"/>
-              <a:t>e.g</a:t>
-            </a:r>
-            <a:r>
-              <a:rPr lang="en-US" sz="900" i="1" dirty="0" smtClean="0"/>
-              <a:t>., files </a:t>
-            </a:r>
-            <a:r>
-              <a:rPr lang="en-US" sz="900" i="1" dirty="0" smtClean="0"/>
-              <a:t>on server</a:t>
-            </a:r>
-            <a:r>
-              <a:rPr lang="en-US" sz="900" i="1" dirty="0" smtClean="0"/>
-              <a:t>,</a:t>
+              <a:rPr lang="en-US" sz="900" i="1" dirty="0"/>
+              <a:t>e.g., files on server,</a:t>
             </a:r>
             <a:br>
-              <a:rPr lang="en-US" sz="900" i="1" dirty="0" smtClean="0"/>
+              <a:rPr lang="en-US" sz="900" i="1" dirty="0"/>
             </a:br>
             <a:r>
-              <a:rPr lang="en-US" sz="900" i="1" dirty="0" smtClean="0"/>
+              <a:rPr lang="en-US" sz="900" i="1" dirty="0"/>
               <a:t>or in a database;</a:t>
             </a:r>
-            <a:endParaRPr lang="en-US" sz="900" i="1" dirty="0"/>
           </a:p>
           <a:p>
             <a:r>
@@ -3168,12 +3152,8 @@
           <a:lstStyle/>
           <a:p>
             <a:r>
-              <a:rPr lang="en-US" sz="1100" b="1" dirty="0" smtClean="0"/>
+              <a:rPr lang="en-US" sz="1100" b="1" dirty="0"/>
               <a:t>Source code</a:t>
-            </a:r>
-            <a:r>
-              <a:rPr lang="en-US" sz="1100" b="1" dirty="0"/>
-              <a:t/>
             </a:r>
             <a:br>
               <a:rPr lang="en-US" sz="1100" b="1" dirty="0"/>
@@ -3291,12 +3271,8 @@
           <a:lstStyle/>
           <a:p>
             <a:r>
-              <a:rPr lang="en-US" sz="1100" b="1" dirty="0" smtClean="0"/>
+              <a:rPr lang="en-US" sz="1100" b="1" dirty="0"/>
               <a:t>File exchange</a:t>
-            </a:r>
-            <a:r>
-              <a:rPr lang="en-US" sz="1100" b="1" dirty="0"/>
-              <a:t/>
             </a:r>
             <a:br>
               <a:rPr lang="en-US" sz="1100" b="1" dirty="0"/>
@@ -3502,21 +3478,8 @@
                   <a:schemeClr val="bg1"/>
                 </a:solidFill>
               </a:rPr>
-              <a:t>Project </a:t>
-            </a:r>
-            <a:r>
-              <a:rPr lang="en-US" sz="1600" dirty="0" smtClean="0">
-                <a:solidFill>
-                  <a:schemeClr val="bg1"/>
-                </a:solidFill>
-              </a:rPr>
-              <a:t>pipeline</a:t>
-            </a:r>
-            <a:endParaRPr lang="en-US" sz="1600" dirty="0">
-              <a:solidFill>
-                <a:schemeClr val="bg1"/>
-              </a:solidFill>
-            </a:endParaRPr>
+              <a:t>Project pipeline</a:t>
+            </a:r>
           </a:p>
         </p:txBody>
       </p:sp>
@@ -3581,23 +3544,7 @@
             </a:br>
             <a:r>
               <a:rPr lang="en-US" sz="900" i="1" dirty="0"/>
-              <a:t>e.g., meeting notes, </a:t>
-            </a:r>
-            <a:r>
-              <a:rPr lang="en-US" sz="900" i="1" dirty="0" smtClean="0"/>
-              <a:t>literature: </a:t>
-            </a:r>
-            <a:r>
-              <a:rPr lang="en-US" sz="900" i="1" dirty="0"/>
-              <a:t>keep on </a:t>
-            </a:r>
-            <a:r>
-              <a:rPr lang="en-US" sz="900" i="1" dirty="0" smtClean="0"/>
-              <a:t>cloud like Dropbox,</a:t>
-            </a:r>
-            <a:r>
-              <a:rPr lang="en-US" sz="900" i="1" dirty="0"/>
-              <a:t/>
+              <a:t>e.g., meeting notes, literature: keep on cloud like Dropbox,</a:t>
             </a:r>
             <a:br>
               <a:rPr lang="en-US" sz="900" i="1" dirty="0"/>
@@ -3639,12 +3586,8 @@
           <a:lstStyle/>
           <a:p>
             <a:r>
-              <a:rPr lang="en-US" sz="1100" b="1" dirty="0" smtClean="0"/>
+              <a:rPr lang="en-US" sz="1100" b="1" dirty="0"/>
               <a:t>Generated temp</a:t>
-            </a:r>
-            <a:r>
-              <a:rPr lang="en-US" sz="1100" b="1" dirty="0"/>
-              <a:t/>
             </a:r>
             <a:br>
               <a:rPr lang="en-US" sz="1100" b="1" dirty="0"/>
@@ -4316,10 +4259,9 @@
           <a:p>
             <a:pPr algn="ctr"/>
             <a:r>
-              <a:rPr lang="en-US" sz="1100" i="1" dirty="0" smtClean="0"/>
+              <a:rPr lang="en-US" sz="1100" i="1" dirty="0"/>
               <a:t>Prepare raw data set for analysis; pass final dataset to file exchange</a:t>
             </a:r>
-            <a:endParaRPr lang="en-US" sz="1100" i="1" dirty="0"/>
           </a:p>
         </p:txBody>
       </p:sp>
@@ -4354,10 +4296,9 @@
           <a:p>
             <a:pPr algn="ctr"/>
             <a:r>
-              <a:rPr lang="en-US" sz="1100" i="1" dirty="0" smtClean="0"/>
+              <a:rPr lang="en-US" sz="1100" i="1" dirty="0"/>
               <a:t>Estimate final model on full data set; write model results to file exchange</a:t>
             </a:r>
-            <a:endParaRPr lang="en-US" sz="1100" i="1" dirty="0"/>
           </a:p>
         </p:txBody>
       </p:sp>
@@ -4392,18 +4333,9 @@
           <a:p>
             <a:pPr algn="ctr"/>
             <a:r>
-              <a:rPr lang="en-US" sz="1100" i="1" dirty="0" smtClean="0"/>
-              <a:t>Read final dataset from file exchange &amp; build </a:t>
-            </a:r>
-            <a:r>
               <a:rPr lang="en-US" sz="1100" i="1" dirty="0"/>
-              <a:t>prototype </a:t>
-            </a:r>
-            <a:r>
-              <a:rPr lang="en-US" sz="1100" i="1" dirty="0" smtClean="0"/>
-              <a:t>model on subset of the data</a:t>
-            </a:r>
-            <a:endParaRPr lang="en-US" sz="1100" i="1" dirty="0"/>
+              <a:t>Read final dataset from file exchange &amp; build prototype model on subset of the data</a:t>
+            </a:r>
           </a:p>
         </p:txBody>
       </p:sp>
@@ -4438,10 +4370,9 @@
           <a:p>
             <a:pPr algn="ctr"/>
             <a:r>
-              <a:rPr lang="en-US" sz="1100" i="1" dirty="0" smtClean="0"/>
+              <a:rPr lang="en-US" sz="1100" i="1" dirty="0"/>
               <a:t>Load final model results and data set; prepare tables and figures &amp; write paper</a:t>
             </a:r>
-            <a:endParaRPr lang="en-US" sz="1100" i="1" dirty="0"/>
           </a:p>
         </p:txBody>
       </p:sp>
@@ -4469,12 +4400,8 @@
           <a:p>
             <a:pPr algn="ctr"/>
             <a:r>
-              <a:rPr lang="en-US" sz="900" i="1" dirty="0" smtClean="0"/>
-              <a:t>e.g</a:t>
-            </a:r>
-            <a:r>
-              <a:rPr lang="en-US" sz="900" i="1" dirty="0" smtClean="0"/>
-              <a:t>., workstation</a:t>
+              <a:rPr lang="en-US" sz="900" i="1" dirty="0"/>
+              <a:t>e.g., workstation</a:t>
             </a:r>
             <a:endParaRPr lang="en-US" sz="1100" dirty="0"/>
           </a:p>
@@ -4504,12 +4431,8 @@
           <a:p>
             <a:pPr algn="ctr"/>
             <a:r>
-              <a:rPr lang="en-US" sz="900" i="1" dirty="0" smtClean="0"/>
-              <a:t>e.g</a:t>
-            </a:r>
-            <a:r>
-              <a:rPr lang="en-US" sz="900" i="1" dirty="0" smtClean="0"/>
-              <a:t>., laptop</a:t>
+              <a:rPr lang="en-US" sz="900" i="1" dirty="0"/>
+              <a:t>e.g., laptop</a:t>
             </a:r>
             <a:endParaRPr lang="en-US" sz="1100" dirty="0"/>
           </a:p>
@@ -4539,12 +4462,8 @@
           <a:p>
             <a:pPr algn="ctr"/>
             <a:r>
-              <a:rPr lang="en-US" sz="900" i="1" dirty="0" smtClean="0"/>
-              <a:t>e.g</a:t>
-            </a:r>
-            <a:r>
-              <a:rPr lang="en-US" sz="900" i="1" dirty="0" smtClean="0"/>
-              <a:t>., cloud instance</a:t>
+              <a:rPr lang="en-US" sz="900" i="1" dirty="0"/>
+              <a:t>e.g., cloud instance</a:t>
             </a:r>
             <a:endParaRPr lang="en-US" sz="1100" dirty="0"/>
           </a:p>
@@ -4574,12 +4493,8 @@
           <a:p>
             <a:pPr algn="ctr"/>
             <a:r>
-              <a:rPr lang="en-US" sz="900" i="1" dirty="0" smtClean="0"/>
-              <a:t>e.g</a:t>
-            </a:r>
-            <a:r>
-              <a:rPr lang="en-US" sz="900" i="1" dirty="0" smtClean="0"/>
-              <a:t>., laptop</a:t>
+              <a:rPr lang="en-US" sz="900" i="1" dirty="0"/>
+              <a:t>e.g., laptop</a:t>
             </a:r>
             <a:endParaRPr lang="en-US" sz="1100" dirty="0"/>
           </a:p>
@@ -4617,6 +4532,2088 @@
       </p:grpSpPr>
       <p:cxnSp>
         <p:nvCxnSpPr>
+          <p:cNvPr id="11" name="Straight Arrow Connector 10">
+            <a:extLst>
+              <a:ext uri="{FF2B5EF4-FFF2-40B4-BE49-F238E27FC236}">
+                <a16:creationId xmlns:a16="http://schemas.microsoft.com/office/drawing/2014/main" id="{1A9879A2-AB36-4209-9276-7DA6F4BC8CBA}"/>
+              </a:ext>
+            </a:extLst>
+          </p:cNvPr>
+          <p:cNvCxnSpPr/>
+          <p:nvPr/>
+        </p:nvCxnSpPr>
+        <p:spPr>
+          <a:xfrm>
+            <a:off x="1701328" y="1765725"/>
+            <a:ext cx="252000" cy="0"/>
+          </a:xfrm>
+          <a:prstGeom prst="straightConnector1">
+            <a:avLst/>
+          </a:prstGeom>
+          <a:ln>
+            <a:tailEnd type="triangle"/>
+          </a:ln>
+        </p:spPr>
+        <p:style>
+          <a:lnRef idx="1">
+            <a:schemeClr val="dk1"/>
+          </a:lnRef>
+          <a:fillRef idx="0">
+            <a:schemeClr val="dk1"/>
+          </a:fillRef>
+          <a:effectRef idx="0">
+            <a:schemeClr val="dk1"/>
+          </a:effectRef>
+          <a:fontRef idx="minor">
+            <a:schemeClr val="tx1"/>
+          </a:fontRef>
+        </p:style>
+      </p:cxnSp>
+      <p:cxnSp>
+        <p:nvCxnSpPr>
+          <p:cNvPr id="64" name="Straight Arrow Connector 63">
+            <a:extLst>
+              <a:ext uri="{FF2B5EF4-FFF2-40B4-BE49-F238E27FC236}">
+                <a16:creationId xmlns:a16="http://schemas.microsoft.com/office/drawing/2014/main" id="{D5BFCD11-28E2-416F-B5AA-E5EFDDD192E6}"/>
+              </a:ext>
+            </a:extLst>
+          </p:cNvPr>
+          <p:cNvCxnSpPr/>
+          <p:nvPr/>
+        </p:nvCxnSpPr>
+        <p:spPr>
+          <a:xfrm>
+            <a:off x="1701328" y="2156140"/>
+            <a:ext cx="252000" cy="0"/>
+          </a:xfrm>
+          <a:prstGeom prst="straightConnector1">
+            <a:avLst/>
+          </a:prstGeom>
+          <a:ln>
+            <a:tailEnd type="triangle"/>
+          </a:ln>
+        </p:spPr>
+        <p:style>
+          <a:lnRef idx="1">
+            <a:schemeClr val="dk1"/>
+          </a:lnRef>
+          <a:fillRef idx="0">
+            <a:schemeClr val="dk1"/>
+          </a:fillRef>
+          <a:effectRef idx="0">
+            <a:schemeClr val="dk1"/>
+          </a:effectRef>
+          <a:fontRef idx="minor">
+            <a:schemeClr val="tx1"/>
+          </a:fontRef>
+        </p:style>
+      </p:cxnSp>
+      <p:cxnSp>
+        <p:nvCxnSpPr>
+          <p:cNvPr id="72" name="Straight Arrow Connector 71">
+            <a:extLst>
+              <a:ext uri="{FF2B5EF4-FFF2-40B4-BE49-F238E27FC236}">
+                <a16:creationId xmlns:a16="http://schemas.microsoft.com/office/drawing/2014/main" id="{3501E185-E259-4ABB-8C62-7F8DF3CFD22C}"/>
+              </a:ext>
+            </a:extLst>
+          </p:cNvPr>
+          <p:cNvCxnSpPr/>
+          <p:nvPr/>
+        </p:nvCxnSpPr>
+        <p:spPr>
+          <a:xfrm>
+            <a:off x="1701328" y="2521864"/>
+            <a:ext cx="252000" cy="0"/>
+          </a:xfrm>
+          <a:prstGeom prst="straightConnector1">
+            <a:avLst/>
+          </a:prstGeom>
+          <a:ln>
+            <a:tailEnd type="triangle"/>
+          </a:ln>
+        </p:spPr>
+        <p:style>
+          <a:lnRef idx="1">
+            <a:schemeClr val="dk1"/>
+          </a:lnRef>
+          <a:fillRef idx="0">
+            <a:schemeClr val="dk1"/>
+          </a:fillRef>
+          <a:effectRef idx="0">
+            <a:schemeClr val="dk1"/>
+          </a:effectRef>
+          <a:fontRef idx="minor">
+            <a:schemeClr val="tx1"/>
+          </a:fontRef>
+        </p:style>
+      </p:cxnSp>
+      <p:sp>
+        <p:nvSpPr>
+          <p:cNvPr id="6" name="TextBox 5"/>
+          <p:cNvSpPr txBox="1"/>
+          <p:nvPr/>
+        </p:nvSpPr>
+        <p:spPr>
+          <a:xfrm>
+            <a:off x="697723" y="1612358"/>
+            <a:ext cx="1005403" cy="261610"/>
+          </a:xfrm>
+          <a:prstGeom prst="rect">
+            <a:avLst/>
+          </a:prstGeom>
+        </p:spPr>
+        <p:style>
+          <a:lnRef idx="2">
+            <a:schemeClr val="dk1"/>
+          </a:lnRef>
+          <a:fillRef idx="1">
+            <a:schemeClr val="lt1"/>
+          </a:fillRef>
+          <a:effectRef idx="0">
+            <a:schemeClr val="dk1"/>
+          </a:effectRef>
+          <a:fontRef idx="minor">
+            <a:schemeClr val="dk1"/>
+          </a:fontRef>
+        </p:style>
+        <p:txBody>
+          <a:bodyPr wrap="none" rtlCol="0">
+            <a:spAutoFit/>
+          </a:bodyPr>
+          <a:lstStyle/>
+          <a:p>
+            <a:r>
+              <a:rPr lang="en-US" sz="1100" dirty="0"/>
+              <a:t>raw data1.xlsx</a:t>
+            </a:r>
+          </a:p>
+        </p:txBody>
+      </p:sp>
+      <p:sp>
+        <p:nvSpPr>
+          <p:cNvPr id="9" name="TextBox 8"/>
+          <p:cNvSpPr txBox="1"/>
+          <p:nvPr/>
+        </p:nvSpPr>
+        <p:spPr>
+          <a:xfrm>
+            <a:off x="4710682" y="772166"/>
+            <a:ext cx="1097280" cy="677108"/>
+          </a:xfrm>
+          <a:prstGeom prst="rect">
+            <a:avLst/>
+          </a:prstGeom>
+          <a:noFill/>
+        </p:spPr>
+        <p:txBody>
+          <a:bodyPr wrap="none" rtlCol="0">
+            <a:spAutoFit/>
+          </a:bodyPr>
+          <a:lstStyle/>
+          <a:p>
+            <a:r>
+              <a:rPr lang="en-US" sz="1100" b="1" dirty="0"/>
+              <a:t>Source code</a:t>
+            </a:r>
+            <a:br>
+              <a:rPr lang="en-US" sz="1100" b="1" dirty="0"/>
+            </a:br>
+            <a:r>
+              <a:rPr lang="en-US" sz="900" i="1" dirty="0"/>
+              <a:t>versioned, </a:t>
+            </a:r>
+            <a:br>
+              <a:rPr lang="en-US" sz="900" i="1" dirty="0"/>
+            </a:br>
+            <a:r>
+              <a:rPr lang="en-US" sz="900" i="1" dirty="0"/>
+              <a:t>e.g., on </a:t>
+            </a:r>
+            <a:r>
+              <a:rPr lang="en-US" sz="900" i="1" dirty="0" err="1"/>
+              <a:t>Git</a:t>
+            </a:r>
+            <a:r>
+              <a:rPr lang="en-US" sz="900" i="1" dirty="0"/>
+              <a:t>,</a:t>
+            </a:r>
+            <a:br>
+              <a:rPr lang="en-US" sz="900" i="1" dirty="0"/>
+            </a:br>
+            <a:r>
+              <a:rPr lang="en-US" sz="900" i="1" dirty="0"/>
+              <a:t>automatic backups</a:t>
+            </a:r>
+            <a:endParaRPr lang="en-US" sz="1600" b="1" dirty="0"/>
+          </a:p>
+        </p:txBody>
+      </p:sp>
+      <p:pic>
+        <p:nvPicPr>
+          <p:cNvPr id="14" name="Picture 13"/>
+          <p:cNvPicPr>
+            <a:picLocks noChangeAspect="1"/>
+          </p:cNvPicPr>
+          <p:nvPr/>
+        </p:nvPicPr>
+        <p:blipFill>
+          <a:blip r:embed="rId2" cstate="print">
+            <a:extLst>
+              <a:ext uri="{28A0092B-C50C-407E-A947-70E740481C1C}">
+                <a14:useLocalDpi xmlns:a14="http://schemas.microsoft.com/office/drawing/2010/main" val="0"/>
+              </a:ext>
+            </a:extLst>
+          </a:blip>
+          <a:stretch>
+            <a:fillRect/>
+          </a:stretch>
+        </p:blipFill>
+        <p:spPr>
+          <a:xfrm flipH="1">
+            <a:off x="2588266" y="2700104"/>
+            <a:ext cx="685800" cy="685800"/>
+          </a:xfrm>
+          <a:prstGeom prst="rect">
+            <a:avLst/>
+          </a:prstGeom>
+        </p:spPr>
+      </p:pic>
+      <p:pic>
+        <p:nvPicPr>
+          <p:cNvPr id="17" name="Picture 16"/>
+          <p:cNvPicPr>
+            <a:picLocks noChangeAspect="1"/>
+          </p:cNvPicPr>
+          <p:nvPr/>
+        </p:nvPicPr>
+        <p:blipFill>
+          <a:blip r:embed="rId3" cstate="print">
+            <a:extLst>
+              <a:ext uri="{28A0092B-C50C-407E-A947-70E740481C1C}">
+                <a14:useLocalDpi xmlns:a14="http://schemas.microsoft.com/office/drawing/2010/main" val="0"/>
+              </a:ext>
+            </a:extLst>
+          </a:blip>
+          <a:stretch>
+            <a:fillRect/>
+          </a:stretch>
+        </p:blipFill>
+        <p:spPr>
+          <a:xfrm>
+            <a:off x="2588266" y="3660158"/>
+            <a:ext cx="685800" cy="685800"/>
+          </a:xfrm>
+          <a:prstGeom prst="rect">
+            <a:avLst/>
+          </a:prstGeom>
+        </p:spPr>
+      </p:pic>
+      <p:sp>
+        <p:nvSpPr>
+          <p:cNvPr id="20" name="TextBox 19"/>
+          <p:cNvSpPr txBox="1"/>
+          <p:nvPr/>
+        </p:nvSpPr>
+        <p:spPr>
+          <a:xfrm>
+            <a:off x="7523686" y="772166"/>
+            <a:ext cx="1281120" cy="954107"/>
+          </a:xfrm>
+          <a:prstGeom prst="rect">
+            <a:avLst/>
+          </a:prstGeom>
+          <a:noFill/>
+        </p:spPr>
+        <p:txBody>
+          <a:bodyPr wrap="none" rtlCol="0">
+            <a:spAutoFit/>
+          </a:bodyPr>
+          <a:lstStyle/>
+          <a:p>
+            <a:r>
+              <a:rPr lang="en-US" sz="1100" b="1" dirty="0"/>
+              <a:t>File exchange</a:t>
+            </a:r>
+            <a:br>
+              <a:rPr lang="en-US" sz="1100" b="1" dirty="0"/>
+            </a:br>
+            <a:r>
+              <a:rPr lang="en-US" sz="900" i="1" dirty="0"/>
+              <a:t>e.g., on temporary file </a:t>
+            </a:r>
+            <a:br>
+              <a:rPr lang="en-US" sz="900" i="1" dirty="0"/>
+            </a:br>
+            <a:r>
+              <a:rPr lang="en-US" sz="900" i="1" dirty="0"/>
+              <a:t>share (like S3); used to </a:t>
+            </a:r>
+            <a:br>
+              <a:rPr lang="en-US" sz="900" i="1" dirty="0"/>
+            </a:br>
+            <a:r>
+              <a:rPr lang="en-US" sz="900" i="1" dirty="0"/>
+              <a:t>pass pre-builds of </a:t>
+            </a:r>
+            <a:br>
+              <a:rPr lang="en-US" sz="900" i="1" dirty="0"/>
+            </a:br>
+            <a:r>
+              <a:rPr lang="en-US" sz="900" i="1" dirty="0"/>
+              <a:t>projects to later stages,</a:t>
+            </a:r>
+            <a:br>
+              <a:rPr lang="en-US" sz="900" i="1" dirty="0"/>
+            </a:br>
+            <a:r>
+              <a:rPr lang="en-US" sz="900" i="1" dirty="0"/>
+              <a:t>no backups</a:t>
+            </a:r>
+            <a:endParaRPr lang="en-US" sz="1100" b="1" i="1" dirty="0"/>
+          </a:p>
+        </p:txBody>
+      </p:sp>
+      <p:pic>
+        <p:nvPicPr>
+          <p:cNvPr id="25" name="Picture 24"/>
+          <p:cNvPicPr>
+            <a:picLocks noChangeAspect="1"/>
+          </p:cNvPicPr>
+          <p:nvPr/>
+        </p:nvPicPr>
+        <p:blipFill>
+          <a:blip r:embed="rId4" cstate="print">
+            <a:extLst>
+              <a:ext uri="{28A0092B-C50C-407E-A947-70E740481C1C}">
+                <a14:useLocalDpi xmlns:a14="http://schemas.microsoft.com/office/drawing/2010/main" val="0"/>
+              </a:ext>
+            </a:extLst>
+          </a:blip>
+          <a:stretch>
+            <a:fillRect/>
+          </a:stretch>
+        </p:blipFill>
+        <p:spPr>
+          <a:xfrm>
+            <a:off x="2588266" y="4621748"/>
+            <a:ext cx="685800" cy="685800"/>
+          </a:xfrm>
+          <a:prstGeom prst="rect">
+            <a:avLst/>
+          </a:prstGeom>
+        </p:spPr>
+      </p:pic>
+      <p:sp>
+        <p:nvSpPr>
+          <p:cNvPr id="26" name="Rectangle 25"/>
+          <p:cNvSpPr/>
+          <p:nvPr/>
+        </p:nvSpPr>
+        <p:spPr>
+          <a:xfrm rot="5400000">
+            <a:off x="6743285" y="-3101813"/>
+            <a:ext cx="261993" cy="7333842"/>
+          </a:xfrm>
+          <a:prstGeom prst="rect">
+            <a:avLst/>
+          </a:prstGeom>
+          <a:solidFill>
+            <a:schemeClr val="accent1"/>
+          </a:solidFill>
+          <a:ln>
+            <a:solidFill>
+              <a:schemeClr val="tx1"/>
+            </a:solidFill>
+          </a:ln>
+        </p:spPr>
+        <p:style>
+          <a:lnRef idx="2">
+            <a:schemeClr val="accent1">
+              <a:shade val="50000"/>
+            </a:schemeClr>
+          </a:lnRef>
+          <a:fillRef idx="1">
+            <a:schemeClr val="accent1"/>
+          </a:fillRef>
+          <a:effectRef idx="0">
+            <a:schemeClr val="accent1"/>
+          </a:effectRef>
+          <a:fontRef idx="minor">
+            <a:schemeClr val="lt1"/>
+          </a:fontRef>
+        </p:style>
+        <p:txBody>
+          <a:bodyPr vert="vert270" rtlCol="0" anchor="ctr"/>
+          <a:lstStyle/>
+          <a:p>
+            <a:pPr algn="ctr"/>
+            <a:r>
+              <a:rPr lang="en-US" sz="1600" dirty="0">
+                <a:solidFill>
+                  <a:schemeClr val="bg1"/>
+                </a:solidFill>
+              </a:rPr>
+              <a:t>Example stage of a project pipeline</a:t>
+            </a:r>
+          </a:p>
+        </p:txBody>
+      </p:sp>
+      <p:sp>
+        <p:nvSpPr>
+          <p:cNvPr id="27" name="Rectangle 26"/>
+          <p:cNvSpPr/>
+          <p:nvPr/>
+        </p:nvSpPr>
+        <p:spPr>
+          <a:xfrm>
+            <a:off x="1935735" y="2700104"/>
+            <a:ext cx="279812" cy="3637502"/>
+          </a:xfrm>
+          <a:prstGeom prst="rect">
+            <a:avLst/>
+          </a:prstGeom>
+          <a:solidFill>
+            <a:schemeClr val="accent1"/>
+          </a:solidFill>
+          <a:ln>
+            <a:solidFill>
+              <a:schemeClr val="tx1"/>
+            </a:solidFill>
+          </a:ln>
+        </p:spPr>
+        <p:style>
+          <a:lnRef idx="2">
+            <a:schemeClr val="accent1">
+              <a:shade val="50000"/>
+            </a:schemeClr>
+          </a:lnRef>
+          <a:fillRef idx="1">
+            <a:schemeClr val="accent1"/>
+          </a:fillRef>
+          <a:effectRef idx="0">
+            <a:schemeClr val="accent1"/>
+          </a:effectRef>
+          <a:fontRef idx="minor">
+            <a:schemeClr val="lt1"/>
+          </a:fontRef>
+        </p:style>
+        <p:txBody>
+          <a:bodyPr vert="vert270" rtlCol="0" anchor="ctr"/>
+          <a:lstStyle/>
+          <a:p>
+            <a:pPr algn="ctr"/>
+            <a:r>
+              <a:rPr lang="en-US" sz="1600" dirty="0">
+                <a:solidFill>
+                  <a:schemeClr val="bg1"/>
+                </a:solidFill>
+              </a:rPr>
+              <a:t>Project pipeline</a:t>
+            </a:r>
+          </a:p>
+        </p:txBody>
+      </p:sp>
+      <p:pic>
+        <p:nvPicPr>
+          <p:cNvPr id="55" name="Picture 54"/>
+          <p:cNvPicPr>
+            <a:picLocks noChangeAspect="1"/>
+          </p:cNvPicPr>
+          <p:nvPr/>
+        </p:nvPicPr>
+        <p:blipFill>
+          <a:blip r:embed="rId5" cstate="print">
+            <a:extLst>
+              <a:ext uri="{28A0092B-C50C-407E-A947-70E740481C1C}">
+                <a14:useLocalDpi xmlns:a14="http://schemas.microsoft.com/office/drawing/2010/main" val="0"/>
+              </a:ext>
+            </a:extLst>
+          </a:blip>
+          <a:stretch>
+            <a:fillRect/>
+          </a:stretch>
+        </p:blipFill>
+        <p:spPr>
+          <a:xfrm>
+            <a:off x="9135929" y="1620915"/>
+            <a:ext cx="685800" cy="685800"/>
+          </a:xfrm>
+          <a:prstGeom prst="rect">
+            <a:avLst/>
+          </a:prstGeom>
+        </p:spPr>
+      </p:pic>
+      <p:sp>
+        <p:nvSpPr>
+          <p:cNvPr id="56" name="TextBox 55"/>
+          <p:cNvSpPr txBox="1"/>
+          <p:nvPr/>
+        </p:nvSpPr>
+        <p:spPr>
+          <a:xfrm>
+            <a:off x="8930189" y="772166"/>
+            <a:ext cx="1097280" cy="815608"/>
+          </a:xfrm>
+          <a:prstGeom prst="rect">
+            <a:avLst/>
+          </a:prstGeom>
+          <a:noFill/>
+        </p:spPr>
+        <p:txBody>
+          <a:bodyPr wrap="square" rtlCol="0">
+            <a:spAutoFit/>
+          </a:bodyPr>
+          <a:lstStyle/>
+          <a:p>
+            <a:r>
+              <a:rPr lang="en-US" sz="1100" b="1" dirty="0"/>
+              <a:t>Notes</a:t>
+            </a:r>
+            <a:br>
+              <a:rPr lang="en-US" sz="1100" b="1" dirty="0"/>
+            </a:br>
+            <a:r>
+              <a:rPr lang="en-US" sz="900" i="1" dirty="0"/>
+              <a:t>e.g., meeting notes, literature: keep on cloud like Dropbox,</a:t>
+            </a:r>
+            <a:br>
+              <a:rPr lang="en-US" sz="900" i="1" dirty="0"/>
+            </a:br>
+            <a:r>
+              <a:rPr lang="en-US" sz="900" i="1" dirty="0"/>
+              <a:t>automatic backups</a:t>
+            </a:r>
+            <a:endParaRPr lang="en-US" sz="1100" b="1" i="1" dirty="0"/>
+          </a:p>
+        </p:txBody>
+      </p:sp>
+      <p:sp>
+        <p:nvSpPr>
+          <p:cNvPr id="28" name="TextBox 27">
+            <a:extLst>
+              <a:ext uri="{FF2B5EF4-FFF2-40B4-BE49-F238E27FC236}">
+                <a16:creationId xmlns:a16="http://schemas.microsoft.com/office/drawing/2014/main" id="{061119A4-F7A6-4B14-A4F4-0B608E31FF4A}"/>
+              </a:ext>
+            </a:extLst>
+          </p:cNvPr>
+          <p:cNvSpPr txBox="1"/>
+          <p:nvPr/>
+        </p:nvSpPr>
+        <p:spPr>
+          <a:xfrm>
+            <a:off x="6117184" y="772166"/>
+            <a:ext cx="1215397" cy="815608"/>
+          </a:xfrm>
+          <a:prstGeom prst="rect">
+            <a:avLst/>
+          </a:prstGeom>
+          <a:noFill/>
+        </p:spPr>
+        <p:txBody>
+          <a:bodyPr wrap="none" rtlCol="0">
+            <a:spAutoFit/>
+          </a:bodyPr>
+          <a:lstStyle/>
+          <a:p>
+            <a:r>
+              <a:rPr lang="en-US" sz="1100" b="1" dirty="0"/>
+              <a:t>Generated temp</a:t>
+            </a:r>
+            <a:br>
+              <a:rPr lang="en-US" sz="1100" b="1" dirty="0"/>
+            </a:br>
+            <a:r>
+              <a:rPr lang="en-US" sz="900" i="1" dirty="0"/>
+              <a:t>temporary files (e.g., </a:t>
+            </a:r>
+            <a:br>
+              <a:rPr lang="en-US" sz="900" i="1" dirty="0"/>
+            </a:br>
+            <a:r>
+              <a:rPr lang="en-US" sz="900" i="1" dirty="0"/>
+              <a:t>converted datasets);</a:t>
+            </a:r>
+            <a:br>
+              <a:rPr lang="en-US" sz="900" i="1" dirty="0"/>
+            </a:br>
+            <a:r>
+              <a:rPr lang="en-US" sz="900" i="1" dirty="0"/>
+              <a:t>all generated by code,</a:t>
+            </a:r>
+            <a:br>
+              <a:rPr lang="en-US" sz="900" i="1" dirty="0"/>
+            </a:br>
+            <a:r>
+              <a:rPr lang="en-US" sz="900" i="1" dirty="0"/>
+              <a:t>and kept locally</a:t>
+            </a:r>
+            <a:endParaRPr lang="en-US" sz="1600" b="1" dirty="0"/>
+          </a:p>
+        </p:txBody>
+      </p:sp>
+      <p:pic>
+        <p:nvPicPr>
+          <p:cNvPr id="3" name="Picture 2"/>
+          <p:cNvPicPr>
+            <a:picLocks noChangeAspect="1"/>
+          </p:cNvPicPr>
+          <p:nvPr/>
+        </p:nvPicPr>
+        <p:blipFill>
+          <a:blip r:embed="rId6" cstate="print">
+            <a:extLst>
+              <a:ext uri="{28A0092B-C50C-407E-A947-70E740481C1C}">
+                <a14:useLocalDpi xmlns:a14="http://schemas.microsoft.com/office/drawing/2010/main" val="0"/>
+              </a:ext>
+            </a:extLst>
+          </a:blip>
+          <a:stretch>
+            <a:fillRect/>
+          </a:stretch>
+        </p:blipFill>
+        <p:spPr>
+          <a:xfrm>
+            <a:off x="7821346" y="1620915"/>
+            <a:ext cx="685800" cy="685800"/>
+          </a:xfrm>
+          <a:prstGeom prst="rect">
+            <a:avLst/>
+          </a:prstGeom>
+        </p:spPr>
+      </p:pic>
+      <p:pic>
+        <p:nvPicPr>
+          <p:cNvPr id="58" name="Picture 57"/>
+          <p:cNvPicPr>
+            <a:picLocks noChangeAspect="1"/>
+          </p:cNvPicPr>
+          <p:nvPr/>
+        </p:nvPicPr>
+        <p:blipFill>
+          <a:blip r:embed="rId3" cstate="print">
+            <a:extLst>
+              <a:ext uri="{28A0092B-C50C-407E-A947-70E740481C1C}">
+                <a14:useLocalDpi xmlns:a14="http://schemas.microsoft.com/office/drawing/2010/main" val="0"/>
+              </a:ext>
+            </a:extLst>
+          </a:blip>
+          <a:stretch>
+            <a:fillRect/>
+          </a:stretch>
+        </p:blipFill>
+        <p:spPr>
+          <a:xfrm>
+            <a:off x="2588266" y="5582569"/>
+            <a:ext cx="685800" cy="685800"/>
+          </a:xfrm>
+          <a:prstGeom prst="rect">
+            <a:avLst/>
+          </a:prstGeom>
+        </p:spPr>
+      </p:pic>
+      <p:grpSp>
+        <p:nvGrpSpPr>
+          <p:cNvPr id="67" name="Group 66"/>
+          <p:cNvGrpSpPr/>
+          <p:nvPr/>
+        </p:nvGrpSpPr>
+        <p:grpSpPr>
+          <a:xfrm>
+            <a:off x="7989121" y="2289612"/>
+            <a:ext cx="350251" cy="3429000"/>
+            <a:chOff x="8043692" y="2289612"/>
+            <a:chExt cx="350251" cy="3429000"/>
+          </a:xfrm>
+        </p:grpSpPr>
+        <p:cxnSp>
+          <p:nvCxnSpPr>
+            <p:cNvPr id="48" name="Straight Arrow Connector 47"/>
+            <p:cNvCxnSpPr/>
+            <p:nvPr/>
+          </p:nvCxnSpPr>
+          <p:spPr>
+            <a:xfrm flipH="1">
+              <a:off x="8043692" y="2294544"/>
+              <a:ext cx="2884" cy="561817"/>
+            </a:xfrm>
+            <a:prstGeom prst="straightConnector1">
+              <a:avLst/>
+            </a:prstGeom>
+            <a:ln w="12700">
+              <a:prstDash val="solid"/>
+              <a:headEnd type="triangle"/>
+              <a:tailEnd type="none"/>
+            </a:ln>
+          </p:spPr>
+          <p:style>
+            <a:lnRef idx="1">
+              <a:schemeClr val="accent1"/>
+            </a:lnRef>
+            <a:fillRef idx="0">
+              <a:schemeClr val="accent1"/>
+            </a:fillRef>
+            <a:effectRef idx="0">
+              <a:schemeClr val="accent1"/>
+            </a:effectRef>
+            <a:fontRef idx="minor">
+              <a:schemeClr val="tx1"/>
+            </a:fontRef>
+          </p:style>
+        </p:cxnSp>
+        <p:cxnSp>
+          <p:nvCxnSpPr>
+            <p:cNvPr id="51" name="Straight Arrow Connector 50"/>
+            <p:cNvCxnSpPr/>
+            <p:nvPr/>
+          </p:nvCxnSpPr>
+          <p:spPr>
+            <a:xfrm flipH="1">
+              <a:off x="8139664" y="2294544"/>
+              <a:ext cx="15918" cy="1508760"/>
+            </a:xfrm>
+            <a:prstGeom prst="straightConnector1">
+              <a:avLst/>
+            </a:prstGeom>
+            <a:ln w="12700">
+              <a:solidFill>
+                <a:schemeClr val="accent2">
+                  <a:lumMod val="40000"/>
+                  <a:lumOff val="60000"/>
+                </a:schemeClr>
+              </a:solidFill>
+              <a:prstDash val="solid"/>
+              <a:headEnd type="triangle"/>
+              <a:tailEnd type="triangle"/>
+            </a:ln>
+          </p:spPr>
+          <p:style>
+            <a:lnRef idx="1">
+              <a:schemeClr val="accent1"/>
+            </a:lnRef>
+            <a:fillRef idx="0">
+              <a:schemeClr val="accent1"/>
+            </a:fillRef>
+            <a:effectRef idx="0">
+              <a:schemeClr val="accent1"/>
+            </a:effectRef>
+            <a:fontRef idx="minor">
+              <a:schemeClr val="tx1"/>
+            </a:fontRef>
+          </p:style>
+        </p:cxnSp>
+        <p:cxnSp>
+          <p:nvCxnSpPr>
+            <p:cNvPr id="54" name="Straight Arrow Connector 53"/>
+            <p:cNvCxnSpPr/>
+            <p:nvPr/>
+          </p:nvCxnSpPr>
+          <p:spPr>
+            <a:xfrm flipH="1">
+              <a:off x="8248670" y="2294544"/>
+              <a:ext cx="26092" cy="2468880"/>
+            </a:xfrm>
+            <a:prstGeom prst="straightConnector1">
+              <a:avLst/>
+            </a:prstGeom>
+            <a:ln w="12700">
+              <a:solidFill>
+                <a:schemeClr val="accent2">
+                  <a:lumMod val="50000"/>
+                </a:schemeClr>
+              </a:solidFill>
+              <a:prstDash val="solid"/>
+              <a:headEnd type="triangle"/>
+              <a:tailEnd type="triangle"/>
+            </a:ln>
+          </p:spPr>
+          <p:style>
+            <a:lnRef idx="1">
+              <a:schemeClr val="accent1"/>
+            </a:lnRef>
+            <a:fillRef idx="0">
+              <a:schemeClr val="accent1"/>
+            </a:fillRef>
+            <a:effectRef idx="0">
+              <a:schemeClr val="accent1"/>
+            </a:effectRef>
+            <a:fontRef idx="minor">
+              <a:schemeClr val="tx1"/>
+            </a:fontRef>
+          </p:style>
+        </p:cxnSp>
+        <p:cxnSp>
+          <p:nvCxnSpPr>
+            <p:cNvPr id="63" name="Straight Arrow Connector 62"/>
+            <p:cNvCxnSpPr/>
+            <p:nvPr/>
+          </p:nvCxnSpPr>
+          <p:spPr>
+            <a:xfrm flipH="1">
+              <a:off x="8367851" y="2289612"/>
+              <a:ext cx="26092" cy="3429000"/>
+            </a:xfrm>
+            <a:prstGeom prst="straightConnector1">
+              <a:avLst/>
+            </a:prstGeom>
+            <a:ln w="12700">
+              <a:solidFill>
+                <a:schemeClr val="accent6">
+                  <a:lumMod val="75000"/>
+                </a:schemeClr>
+              </a:solidFill>
+              <a:prstDash val="solid"/>
+              <a:headEnd type="none"/>
+              <a:tailEnd type="triangle"/>
+            </a:ln>
+          </p:spPr>
+          <p:style>
+            <a:lnRef idx="1">
+              <a:schemeClr val="accent1"/>
+            </a:lnRef>
+            <a:fillRef idx="0">
+              <a:schemeClr val="accent1"/>
+            </a:fillRef>
+            <a:effectRef idx="0">
+              <a:schemeClr val="accent1"/>
+            </a:effectRef>
+            <a:fontRef idx="minor">
+              <a:schemeClr val="tx1"/>
+            </a:fontRef>
+          </p:style>
+        </p:cxnSp>
+      </p:grpSp>
+      <p:sp>
+        <p:nvSpPr>
+          <p:cNvPr id="37" name="TextBox 36"/>
+          <p:cNvSpPr txBox="1"/>
+          <p:nvPr/>
+        </p:nvSpPr>
+        <p:spPr>
+          <a:xfrm>
+            <a:off x="692760" y="1229723"/>
+            <a:ext cx="2611420" cy="261994"/>
+          </a:xfrm>
+          <a:prstGeom prst="rect">
+            <a:avLst/>
+          </a:prstGeom>
+          <a:solidFill>
+            <a:schemeClr val="bg1"/>
+          </a:solidFill>
+          <a:ln>
+            <a:solidFill>
+              <a:schemeClr val="tx1"/>
+            </a:solidFill>
+          </a:ln>
+        </p:spPr>
+        <p:txBody>
+          <a:bodyPr wrap="square" rtlCol="0">
+            <a:spAutoFit/>
+          </a:bodyPr>
+          <a:lstStyle/>
+          <a:p>
+            <a:pPr algn="ctr"/>
+            <a:r>
+              <a:rPr lang="en-US" sz="1100" i="1" dirty="0"/>
+              <a:t>1. Convert raw data to CSV</a:t>
+            </a:r>
+          </a:p>
+        </p:txBody>
+      </p:sp>
+      <p:sp>
+        <p:nvSpPr>
+          <p:cNvPr id="44" name="TextBox 43"/>
+          <p:cNvSpPr txBox="1"/>
+          <p:nvPr/>
+        </p:nvSpPr>
+        <p:spPr>
+          <a:xfrm>
+            <a:off x="3645326" y="4833843"/>
+            <a:ext cx="5029200" cy="261610"/>
+          </a:xfrm>
+          <a:prstGeom prst="rect">
+            <a:avLst/>
+          </a:prstGeom>
+          <a:solidFill>
+            <a:schemeClr val="bg1"/>
+          </a:solidFill>
+          <a:ln>
+            <a:solidFill>
+              <a:schemeClr val="tx1"/>
+            </a:solidFill>
+          </a:ln>
+        </p:spPr>
+        <p:txBody>
+          <a:bodyPr wrap="square" rtlCol="0">
+            <a:spAutoFit/>
+          </a:bodyPr>
+          <a:lstStyle/>
+          <a:p>
+            <a:pPr algn="ctr"/>
+            <a:r>
+              <a:rPr lang="en-US" sz="1100" i="1" dirty="0"/>
+              <a:t>Estimate final model on full data set; write model results to file exchange</a:t>
+            </a:r>
+          </a:p>
+        </p:txBody>
+      </p:sp>
+      <p:sp>
+        <p:nvSpPr>
+          <p:cNvPr id="42" name="TextBox 41"/>
+          <p:cNvSpPr txBox="1"/>
+          <p:nvPr/>
+        </p:nvSpPr>
+        <p:spPr>
+          <a:xfrm>
+            <a:off x="3645326" y="3873021"/>
+            <a:ext cx="5029200" cy="261610"/>
+          </a:xfrm>
+          <a:prstGeom prst="rect">
+            <a:avLst/>
+          </a:prstGeom>
+          <a:solidFill>
+            <a:schemeClr val="bg1"/>
+          </a:solidFill>
+          <a:ln>
+            <a:solidFill>
+              <a:schemeClr val="tx1"/>
+            </a:solidFill>
+          </a:ln>
+        </p:spPr>
+        <p:txBody>
+          <a:bodyPr wrap="square" rtlCol="0">
+            <a:spAutoFit/>
+          </a:bodyPr>
+          <a:lstStyle/>
+          <a:p>
+            <a:pPr algn="ctr"/>
+            <a:r>
+              <a:rPr lang="en-US" sz="1100" i="1" dirty="0"/>
+              <a:t>Read final dataset from file exchange &amp; build prototype model on subset of the data</a:t>
+            </a:r>
+          </a:p>
+        </p:txBody>
+      </p:sp>
+      <p:sp>
+        <p:nvSpPr>
+          <p:cNvPr id="60" name="TextBox 59"/>
+          <p:cNvSpPr txBox="1"/>
+          <p:nvPr/>
+        </p:nvSpPr>
+        <p:spPr>
+          <a:xfrm>
+            <a:off x="3645326" y="5794664"/>
+            <a:ext cx="5029200" cy="261610"/>
+          </a:xfrm>
+          <a:prstGeom prst="rect">
+            <a:avLst/>
+          </a:prstGeom>
+          <a:solidFill>
+            <a:schemeClr val="bg1"/>
+          </a:solidFill>
+          <a:ln>
+            <a:solidFill>
+              <a:schemeClr val="tx1"/>
+            </a:solidFill>
+          </a:ln>
+        </p:spPr>
+        <p:txBody>
+          <a:bodyPr wrap="square" rtlCol="0">
+            <a:spAutoFit/>
+          </a:bodyPr>
+          <a:lstStyle/>
+          <a:p>
+            <a:pPr algn="ctr"/>
+            <a:r>
+              <a:rPr lang="en-US" sz="1100" i="1" dirty="0"/>
+              <a:t>Load final model results and data set; prepare tables and figures &amp; write paper</a:t>
+            </a:r>
+          </a:p>
+        </p:txBody>
+      </p:sp>
+      <p:sp>
+        <p:nvSpPr>
+          <p:cNvPr id="68" name="TextBox 67"/>
+          <p:cNvSpPr txBox="1"/>
+          <p:nvPr/>
+        </p:nvSpPr>
+        <p:spPr>
+          <a:xfrm>
+            <a:off x="2445296" y="3268952"/>
+            <a:ext cx="971741" cy="230832"/>
+          </a:xfrm>
+          <a:prstGeom prst="rect">
+            <a:avLst/>
+          </a:prstGeom>
+          <a:noFill/>
+        </p:spPr>
+        <p:txBody>
+          <a:bodyPr wrap="none" rtlCol="0">
+            <a:spAutoFit/>
+          </a:bodyPr>
+          <a:lstStyle/>
+          <a:p>
+            <a:pPr algn="ctr"/>
+            <a:r>
+              <a:rPr lang="en-US" sz="900" i="1" dirty="0"/>
+              <a:t>e.g., workstation</a:t>
+            </a:r>
+            <a:endParaRPr lang="en-US" sz="1100" dirty="0"/>
+          </a:p>
+        </p:txBody>
+      </p:sp>
+      <p:sp>
+        <p:nvSpPr>
+          <p:cNvPr id="69" name="TextBox 68"/>
+          <p:cNvSpPr txBox="1"/>
+          <p:nvPr/>
+        </p:nvSpPr>
+        <p:spPr>
+          <a:xfrm>
+            <a:off x="2574338" y="4214893"/>
+            <a:ext cx="713657" cy="230832"/>
+          </a:xfrm>
+          <a:prstGeom prst="rect">
+            <a:avLst/>
+          </a:prstGeom>
+          <a:noFill/>
+        </p:spPr>
+        <p:txBody>
+          <a:bodyPr wrap="none" rtlCol="0">
+            <a:spAutoFit/>
+          </a:bodyPr>
+          <a:lstStyle/>
+          <a:p>
+            <a:pPr algn="ctr"/>
+            <a:r>
+              <a:rPr lang="en-US" sz="900" i="1" dirty="0"/>
+              <a:t>e.g., laptop</a:t>
+            </a:r>
+            <a:endParaRPr lang="en-US" sz="1100" dirty="0"/>
+          </a:p>
+        </p:txBody>
+      </p:sp>
+      <p:sp>
+        <p:nvSpPr>
+          <p:cNvPr id="70" name="TextBox 69"/>
+          <p:cNvSpPr txBox="1"/>
+          <p:nvPr/>
+        </p:nvSpPr>
+        <p:spPr>
+          <a:xfrm>
+            <a:off x="2390794" y="5160834"/>
+            <a:ext cx="1080745" cy="230832"/>
+          </a:xfrm>
+          <a:prstGeom prst="rect">
+            <a:avLst/>
+          </a:prstGeom>
+          <a:noFill/>
+        </p:spPr>
+        <p:txBody>
+          <a:bodyPr wrap="none" rtlCol="0">
+            <a:spAutoFit/>
+          </a:bodyPr>
+          <a:lstStyle/>
+          <a:p>
+            <a:pPr algn="ctr"/>
+            <a:r>
+              <a:rPr lang="en-US" sz="900" i="1" dirty="0"/>
+              <a:t>e.g., cloud instance</a:t>
+            </a:r>
+            <a:endParaRPr lang="en-US" sz="1100" dirty="0"/>
+          </a:p>
+        </p:txBody>
+      </p:sp>
+      <p:sp>
+        <p:nvSpPr>
+          <p:cNvPr id="71" name="TextBox 70"/>
+          <p:cNvSpPr txBox="1"/>
+          <p:nvPr/>
+        </p:nvSpPr>
+        <p:spPr>
+          <a:xfrm>
+            <a:off x="2574338" y="6106774"/>
+            <a:ext cx="713657" cy="230832"/>
+          </a:xfrm>
+          <a:prstGeom prst="rect">
+            <a:avLst/>
+          </a:prstGeom>
+          <a:noFill/>
+        </p:spPr>
+        <p:txBody>
+          <a:bodyPr wrap="none" rtlCol="0">
+            <a:spAutoFit/>
+          </a:bodyPr>
+          <a:lstStyle/>
+          <a:p>
+            <a:pPr algn="ctr"/>
+            <a:r>
+              <a:rPr lang="en-US" sz="900" i="1" dirty="0"/>
+              <a:t>e.g., laptop</a:t>
+            </a:r>
+            <a:endParaRPr lang="en-US" sz="1100" dirty="0"/>
+          </a:p>
+        </p:txBody>
+      </p:sp>
+      <p:pic>
+        <p:nvPicPr>
+          <p:cNvPr id="8" name="Picture 7">
+            <a:extLst>
+              <a:ext uri="{FF2B5EF4-FFF2-40B4-BE49-F238E27FC236}">
+                <a16:creationId xmlns:a16="http://schemas.microsoft.com/office/drawing/2014/main" id="{9634D0EE-82FE-49BB-B234-E88C40A3AE21}"/>
+              </a:ext>
+            </a:extLst>
+          </p:cNvPr>
+          <p:cNvPicPr>
+            <a:picLocks noChangeAspect="1"/>
+          </p:cNvPicPr>
+          <p:nvPr/>
+        </p:nvPicPr>
+        <p:blipFill>
+          <a:blip r:embed="rId7">
+            <a:extLst>
+              <a:ext uri="{28A0092B-C50C-407E-A947-70E740481C1C}">
+                <a14:useLocalDpi xmlns:a14="http://schemas.microsoft.com/office/drawing/2010/main" val="0"/>
+              </a:ext>
+            </a:extLst>
+          </a:blip>
+          <a:stretch>
+            <a:fillRect/>
+          </a:stretch>
+        </p:blipFill>
+        <p:spPr>
+          <a:xfrm>
+            <a:off x="2840858" y="5010097"/>
+            <a:ext cx="10296525" cy="2228850"/>
+          </a:xfrm>
+          <a:prstGeom prst="rect">
+            <a:avLst/>
+          </a:prstGeom>
+        </p:spPr>
+      </p:pic>
+      <p:sp>
+        <p:nvSpPr>
+          <p:cNvPr id="45" name="TextBox 44">
+            <a:extLst>
+              <a:ext uri="{FF2B5EF4-FFF2-40B4-BE49-F238E27FC236}">
+                <a16:creationId xmlns:a16="http://schemas.microsoft.com/office/drawing/2014/main" id="{74936DF1-6BD1-466A-96D0-1721BEEC87AF}"/>
+              </a:ext>
+            </a:extLst>
+          </p:cNvPr>
+          <p:cNvSpPr txBox="1"/>
+          <p:nvPr/>
+        </p:nvSpPr>
+        <p:spPr>
+          <a:xfrm>
+            <a:off x="4480351" y="1244078"/>
+            <a:ext cx="2611420" cy="261994"/>
+          </a:xfrm>
+          <a:prstGeom prst="rect">
+            <a:avLst/>
+          </a:prstGeom>
+          <a:solidFill>
+            <a:schemeClr val="bg1"/>
+          </a:solidFill>
+          <a:ln>
+            <a:solidFill>
+              <a:schemeClr val="tx1"/>
+            </a:solidFill>
+          </a:ln>
+        </p:spPr>
+        <p:txBody>
+          <a:bodyPr wrap="square" rtlCol="0">
+            <a:spAutoFit/>
+          </a:bodyPr>
+          <a:lstStyle/>
+          <a:p>
+            <a:pPr algn="ctr"/>
+            <a:r>
+              <a:rPr lang="en-US" sz="1100" i="1" dirty="0"/>
+              <a:t>2. Merge CSV files</a:t>
+            </a:r>
+          </a:p>
+        </p:txBody>
+      </p:sp>
+      <p:sp>
+        <p:nvSpPr>
+          <p:cNvPr id="46" name="TextBox 45">
+            <a:extLst>
+              <a:ext uri="{FF2B5EF4-FFF2-40B4-BE49-F238E27FC236}">
+                <a16:creationId xmlns:a16="http://schemas.microsoft.com/office/drawing/2014/main" id="{6314EA48-5709-47EE-95FC-3BFBEAB208DB}"/>
+              </a:ext>
+            </a:extLst>
+          </p:cNvPr>
+          <p:cNvSpPr txBox="1"/>
+          <p:nvPr/>
+        </p:nvSpPr>
+        <p:spPr>
+          <a:xfrm>
+            <a:off x="6109682" y="1238737"/>
+            <a:ext cx="2611420" cy="261994"/>
+          </a:xfrm>
+          <a:prstGeom prst="rect">
+            <a:avLst/>
+          </a:prstGeom>
+          <a:solidFill>
+            <a:schemeClr val="bg1"/>
+          </a:solidFill>
+          <a:ln>
+            <a:solidFill>
+              <a:schemeClr val="tx1"/>
+            </a:solidFill>
+          </a:ln>
+        </p:spPr>
+        <p:txBody>
+          <a:bodyPr wrap="square" rtlCol="0">
+            <a:spAutoFit/>
+          </a:bodyPr>
+          <a:lstStyle/>
+          <a:p>
+            <a:pPr algn="ctr"/>
+            <a:r>
+              <a:rPr lang="en-US" sz="1100" i="1" dirty="0"/>
+              <a:t>3. Clean data, and save for other stages</a:t>
+            </a:r>
+          </a:p>
+        </p:txBody>
+      </p:sp>
+      <p:sp>
+        <p:nvSpPr>
+          <p:cNvPr id="57" name="TextBox 56">
+            <a:extLst>
+              <a:ext uri="{FF2B5EF4-FFF2-40B4-BE49-F238E27FC236}">
+                <a16:creationId xmlns:a16="http://schemas.microsoft.com/office/drawing/2014/main" id="{14218CA6-7511-4F5C-BEAB-40FFC3566DE5}"/>
+              </a:ext>
+            </a:extLst>
+          </p:cNvPr>
+          <p:cNvSpPr txBox="1"/>
+          <p:nvPr/>
+        </p:nvSpPr>
+        <p:spPr>
+          <a:xfrm>
+            <a:off x="697723" y="2002729"/>
+            <a:ext cx="1005403" cy="261610"/>
+          </a:xfrm>
+          <a:prstGeom prst="rect">
+            <a:avLst/>
+          </a:prstGeom>
+        </p:spPr>
+        <p:style>
+          <a:lnRef idx="2">
+            <a:schemeClr val="dk1"/>
+          </a:lnRef>
+          <a:fillRef idx="1">
+            <a:schemeClr val="lt1"/>
+          </a:fillRef>
+          <a:effectRef idx="0">
+            <a:schemeClr val="dk1"/>
+          </a:effectRef>
+          <a:fontRef idx="minor">
+            <a:schemeClr val="dk1"/>
+          </a:fontRef>
+        </p:style>
+        <p:txBody>
+          <a:bodyPr wrap="none" rtlCol="0">
+            <a:spAutoFit/>
+          </a:bodyPr>
+          <a:lstStyle/>
+          <a:p>
+            <a:r>
+              <a:rPr lang="en-US" sz="1100" dirty="0"/>
+              <a:t>raw data2.xlsx</a:t>
+            </a:r>
+          </a:p>
+        </p:txBody>
+      </p:sp>
+      <p:sp>
+        <p:nvSpPr>
+          <p:cNvPr id="59" name="TextBox 58">
+            <a:extLst>
+              <a:ext uri="{FF2B5EF4-FFF2-40B4-BE49-F238E27FC236}">
+                <a16:creationId xmlns:a16="http://schemas.microsoft.com/office/drawing/2014/main" id="{62CDEE9C-75B9-417F-B87C-5D709F90BE6A}"/>
+              </a:ext>
+            </a:extLst>
+          </p:cNvPr>
+          <p:cNvSpPr txBox="1"/>
+          <p:nvPr/>
+        </p:nvSpPr>
+        <p:spPr>
+          <a:xfrm>
+            <a:off x="697723" y="2393100"/>
+            <a:ext cx="1005403" cy="261610"/>
+          </a:xfrm>
+          <a:prstGeom prst="rect">
+            <a:avLst/>
+          </a:prstGeom>
+        </p:spPr>
+        <p:style>
+          <a:lnRef idx="2">
+            <a:schemeClr val="dk1"/>
+          </a:lnRef>
+          <a:fillRef idx="1">
+            <a:schemeClr val="lt1"/>
+          </a:fillRef>
+          <a:effectRef idx="0">
+            <a:schemeClr val="dk1"/>
+          </a:effectRef>
+          <a:fontRef idx="minor">
+            <a:schemeClr val="dk1"/>
+          </a:fontRef>
+        </p:style>
+        <p:txBody>
+          <a:bodyPr wrap="none" rtlCol="0">
+            <a:spAutoFit/>
+          </a:bodyPr>
+          <a:lstStyle/>
+          <a:p>
+            <a:r>
+              <a:rPr lang="en-US" sz="1100" dirty="0"/>
+              <a:t>raw data3.xlsx</a:t>
+            </a:r>
+          </a:p>
+        </p:txBody>
+      </p:sp>
+      <p:sp>
+        <p:nvSpPr>
+          <p:cNvPr id="74" name="TextBox 73">
+            <a:extLst>
+              <a:ext uri="{FF2B5EF4-FFF2-40B4-BE49-F238E27FC236}">
+                <a16:creationId xmlns:a16="http://schemas.microsoft.com/office/drawing/2014/main" id="{CBBCE5CC-7B1B-4A7C-819A-5361AC081FC1}"/>
+              </a:ext>
+            </a:extLst>
+          </p:cNvPr>
+          <p:cNvSpPr txBox="1"/>
+          <p:nvPr/>
+        </p:nvSpPr>
+        <p:spPr>
+          <a:xfrm>
+            <a:off x="1963247" y="1612358"/>
+            <a:ext cx="1350050" cy="261610"/>
+          </a:xfrm>
+          <a:prstGeom prst="rect">
+            <a:avLst/>
+          </a:prstGeom>
+          <a:solidFill>
+            <a:schemeClr val="bg2"/>
+          </a:solidFill>
+          <a:ln>
+            <a:solidFill>
+              <a:schemeClr val="tx1"/>
+            </a:solidFill>
+          </a:ln>
+        </p:spPr>
+        <p:style>
+          <a:lnRef idx="2">
+            <a:schemeClr val="dk1"/>
+          </a:lnRef>
+          <a:fillRef idx="1">
+            <a:schemeClr val="lt1"/>
+          </a:fillRef>
+          <a:effectRef idx="0">
+            <a:schemeClr val="dk1"/>
+          </a:effectRef>
+          <a:fontRef idx="minor">
+            <a:schemeClr val="dk1"/>
+          </a:fontRef>
+        </p:style>
+        <p:txBody>
+          <a:bodyPr wrap="none" rtlCol="0">
+            <a:spAutoFit/>
+          </a:bodyPr>
+          <a:lstStyle/>
+          <a:p>
+            <a:r>
+              <a:rPr lang="en-US" sz="1100" dirty="0"/>
+              <a:t>Rule: convert to CSV</a:t>
+            </a:r>
+          </a:p>
+        </p:txBody>
+      </p:sp>
+      <p:sp>
+        <p:nvSpPr>
+          <p:cNvPr id="75" name="TextBox 74">
+            <a:extLst>
+              <a:ext uri="{FF2B5EF4-FFF2-40B4-BE49-F238E27FC236}">
+                <a16:creationId xmlns:a16="http://schemas.microsoft.com/office/drawing/2014/main" id="{1750B521-4129-4A38-B327-6FFA4977182B}"/>
+              </a:ext>
+            </a:extLst>
+          </p:cNvPr>
+          <p:cNvSpPr txBox="1"/>
+          <p:nvPr/>
+        </p:nvSpPr>
+        <p:spPr>
+          <a:xfrm>
+            <a:off x="1957827" y="2002729"/>
+            <a:ext cx="1350050" cy="261610"/>
+          </a:xfrm>
+          <a:prstGeom prst="rect">
+            <a:avLst/>
+          </a:prstGeom>
+          <a:solidFill>
+            <a:schemeClr val="bg2"/>
+          </a:solidFill>
+          <a:ln>
+            <a:solidFill>
+              <a:schemeClr val="tx1"/>
+            </a:solidFill>
+          </a:ln>
+        </p:spPr>
+        <p:style>
+          <a:lnRef idx="2">
+            <a:schemeClr val="dk1"/>
+          </a:lnRef>
+          <a:fillRef idx="1">
+            <a:schemeClr val="lt1"/>
+          </a:fillRef>
+          <a:effectRef idx="0">
+            <a:schemeClr val="dk1"/>
+          </a:effectRef>
+          <a:fontRef idx="minor">
+            <a:schemeClr val="dk1"/>
+          </a:fontRef>
+        </p:style>
+        <p:txBody>
+          <a:bodyPr wrap="none" rtlCol="0">
+            <a:spAutoFit/>
+          </a:bodyPr>
+          <a:lstStyle/>
+          <a:p>
+            <a:r>
+              <a:rPr lang="en-US" sz="1100" dirty="0"/>
+              <a:t>Rule: convert to CSV</a:t>
+            </a:r>
+          </a:p>
+        </p:txBody>
+      </p:sp>
+      <p:sp>
+        <p:nvSpPr>
+          <p:cNvPr id="76" name="TextBox 75">
+            <a:extLst>
+              <a:ext uri="{FF2B5EF4-FFF2-40B4-BE49-F238E27FC236}">
+                <a16:creationId xmlns:a16="http://schemas.microsoft.com/office/drawing/2014/main" id="{5D59ED16-519C-4FB4-B1CB-BA2256726BF0}"/>
+              </a:ext>
+            </a:extLst>
+          </p:cNvPr>
+          <p:cNvSpPr txBox="1"/>
+          <p:nvPr/>
+        </p:nvSpPr>
+        <p:spPr>
+          <a:xfrm>
+            <a:off x="1950413" y="2393100"/>
+            <a:ext cx="1350050" cy="261610"/>
+          </a:xfrm>
+          <a:prstGeom prst="rect">
+            <a:avLst/>
+          </a:prstGeom>
+          <a:solidFill>
+            <a:schemeClr val="bg2"/>
+          </a:solidFill>
+          <a:ln>
+            <a:solidFill>
+              <a:schemeClr val="tx1"/>
+            </a:solidFill>
+          </a:ln>
+        </p:spPr>
+        <p:style>
+          <a:lnRef idx="2">
+            <a:schemeClr val="dk1"/>
+          </a:lnRef>
+          <a:fillRef idx="1">
+            <a:schemeClr val="lt1"/>
+          </a:fillRef>
+          <a:effectRef idx="0">
+            <a:schemeClr val="dk1"/>
+          </a:effectRef>
+          <a:fontRef idx="minor">
+            <a:schemeClr val="dk1"/>
+          </a:fontRef>
+        </p:style>
+        <p:txBody>
+          <a:bodyPr wrap="none" rtlCol="0">
+            <a:spAutoFit/>
+          </a:bodyPr>
+          <a:lstStyle/>
+          <a:p>
+            <a:r>
+              <a:rPr lang="en-US" sz="1100" dirty="0"/>
+              <a:t>Rule: convert to CSV</a:t>
+            </a:r>
+          </a:p>
+        </p:txBody>
+      </p:sp>
+      <p:sp>
+        <p:nvSpPr>
+          <p:cNvPr id="77" name="TextBox 76">
+            <a:extLst>
+              <a:ext uri="{FF2B5EF4-FFF2-40B4-BE49-F238E27FC236}">
+                <a16:creationId xmlns:a16="http://schemas.microsoft.com/office/drawing/2014/main" id="{C0ACCB7F-5AB7-4281-809F-9E1CCB92A0D5}"/>
+              </a:ext>
+            </a:extLst>
+          </p:cNvPr>
+          <p:cNvSpPr txBox="1"/>
+          <p:nvPr/>
+        </p:nvSpPr>
+        <p:spPr>
+          <a:xfrm>
+            <a:off x="3568375" y="1612358"/>
+            <a:ext cx="1204176" cy="261610"/>
+          </a:xfrm>
+          <a:prstGeom prst="rect">
+            <a:avLst/>
+          </a:prstGeom>
+        </p:spPr>
+        <p:style>
+          <a:lnRef idx="2">
+            <a:schemeClr val="dk1"/>
+          </a:lnRef>
+          <a:fillRef idx="1">
+            <a:schemeClr val="lt1"/>
+          </a:fillRef>
+          <a:effectRef idx="0">
+            <a:schemeClr val="dk1"/>
+          </a:effectRef>
+          <a:fontRef idx="minor">
+            <a:schemeClr val="dk1"/>
+          </a:fontRef>
+        </p:style>
+        <p:txBody>
+          <a:bodyPr wrap="none" rtlCol="0">
+            <a:spAutoFit/>
+          </a:bodyPr>
+          <a:lstStyle/>
+          <a:p>
+            <a:r>
+              <a:rPr lang="en-US" sz="1100" dirty="0"/>
+              <a:t>cleaned data1.csv</a:t>
+            </a:r>
+          </a:p>
+        </p:txBody>
+      </p:sp>
+      <p:sp>
+        <p:nvSpPr>
+          <p:cNvPr id="78" name="TextBox 77">
+            <a:extLst>
+              <a:ext uri="{FF2B5EF4-FFF2-40B4-BE49-F238E27FC236}">
+                <a16:creationId xmlns:a16="http://schemas.microsoft.com/office/drawing/2014/main" id="{1FBF8594-30D8-4B0D-BE09-F2D3F8EA96BE}"/>
+              </a:ext>
+            </a:extLst>
+          </p:cNvPr>
+          <p:cNvSpPr txBox="1"/>
+          <p:nvPr/>
+        </p:nvSpPr>
+        <p:spPr>
+          <a:xfrm>
+            <a:off x="3568375" y="2002729"/>
+            <a:ext cx="1204176" cy="261610"/>
+          </a:xfrm>
+          <a:prstGeom prst="rect">
+            <a:avLst/>
+          </a:prstGeom>
+        </p:spPr>
+        <p:style>
+          <a:lnRef idx="2">
+            <a:schemeClr val="dk1"/>
+          </a:lnRef>
+          <a:fillRef idx="1">
+            <a:schemeClr val="lt1"/>
+          </a:fillRef>
+          <a:effectRef idx="0">
+            <a:schemeClr val="dk1"/>
+          </a:effectRef>
+          <a:fontRef idx="minor">
+            <a:schemeClr val="dk1"/>
+          </a:fontRef>
+        </p:style>
+        <p:txBody>
+          <a:bodyPr wrap="none" rtlCol="0">
+            <a:spAutoFit/>
+          </a:bodyPr>
+          <a:lstStyle/>
+          <a:p>
+            <a:r>
+              <a:rPr lang="en-US" sz="1100" dirty="0"/>
+              <a:t>cleaned data2.csv</a:t>
+            </a:r>
+          </a:p>
+        </p:txBody>
+      </p:sp>
+      <p:sp>
+        <p:nvSpPr>
+          <p:cNvPr id="79" name="TextBox 78">
+            <a:extLst>
+              <a:ext uri="{FF2B5EF4-FFF2-40B4-BE49-F238E27FC236}">
+                <a16:creationId xmlns:a16="http://schemas.microsoft.com/office/drawing/2014/main" id="{2FEF468A-9731-4FB3-B534-EDC5AAEF08AA}"/>
+              </a:ext>
+            </a:extLst>
+          </p:cNvPr>
+          <p:cNvSpPr txBox="1"/>
+          <p:nvPr/>
+        </p:nvSpPr>
+        <p:spPr>
+          <a:xfrm>
+            <a:off x="3568375" y="2393100"/>
+            <a:ext cx="1220206" cy="261610"/>
+          </a:xfrm>
+          <a:prstGeom prst="rect">
+            <a:avLst/>
+          </a:prstGeom>
+        </p:spPr>
+        <p:style>
+          <a:lnRef idx="2">
+            <a:schemeClr val="dk1"/>
+          </a:lnRef>
+          <a:fillRef idx="1">
+            <a:schemeClr val="lt1"/>
+          </a:fillRef>
+          <a:effectRef idx="0">
+            <a:schemeClr val="dk1"/>
+          </a:effectRef>
+          <a:fontRef idx="minor">
+            <a:schemeClr val="dk1"/>
+          </a:fontRef>
+        </p:style>
+        <p:txBody>
+          <a:bodyPr wrap="none" rtlCol="0">
+            <a:spAutoFit/>
+          </a:bodyPr>
+          <a:lstStyle/>
+          <a:p>
+            <a:r>
+              <a:rPr lang="en-US" sz="1100" dirty="0"/>
+              <a:t>cleaned data3.csv</a:t>
+            </a:r>
+          </a:p>
+        </p:txBody>
+      </p:sp>
+      <p:cxnSp>
+        <p:nvCxnSpPr>
+          <p:cNvPr id="80" name="Straight Arrow Connector 79">
+            <a:extLst>
+              <a:ext uri="{FF2B5EF4-FFF2-40B4-BE49-F238E27FC236}">
+                <a16:creationId xmlns:a16="http://schemas.microsoft.com/office/drawing/2014/main" id="{A32266C2-3D32-4079-896F-99674EA5C3C6}"/>
+              </a:ext>
+            </a:extLst>
+          </p:cNvPr>
+          <p:cNvCxnSpPr/>
+          <p:nvPr/>
+        </p:nvCxnSpPr>
+        <p:spPr>
+          <a:xfrm>
+            <a:off x="3307877" y="1755783"/>
+            <a:ext cx="252000" cy="0"/>
+          </a:xfrm>
+          <a:prstGeom prst="straightConnector1">
+            <a:avLst/>
+          </a:prstGeom>
+          <a:ln>
+            <a:tailEnd type="triangle"/>
+          </a:ln>
+        </p:spPr>
+        <p:style>
+          <a:lnRef idx="1">
+            <a:schemeClr val="dk1"/>
+          </a:lnRef>
+          <a:fillRef idx="0">
+            <a:schemeClr val="dk1"/>
+          </a:fillRef>
+          <a:effectRef idx="0">
+            <a:schemeClr val="dk1"/>
+          </a:effectRef>
+          <a:fontRef idx="minor">
+            <a:schemeClr val="tx1"/>
+          </a:fontRef>
+        </p:style>
+      </p:cxnSp>
+      <p:cxnSp>
+        <p:nvCxnSpPr>
+          <p:cNvPr id="81" name="Straight Arrow Connector 80">
+            <a:extLst>
+              <a:ext uri="{FF2B5EF4-FFF2-40B4-BE49-F238E27FC236}">
+                <a16:creationId xmlns:a16="http://schemas.microsoft.com/office/drawing/2014/main" id="{50E5D67D-03E3-4A1A-B01B-FCC1D842A3DF}"/>
+              </a:ext>
+            </a:extLst>
+          </p:cNvPr>
+          <p:cNvCxnSpPr/>
+          <p:nvPr/>
+        </p:nvCxnSpPr>
+        <p:spPr>
+          <a:xfrm>
+            <a:off x="3307877" y="2146198"/>
+            <a:ext cx="252000" cy="0"/>
+          </a:xfrm>
+          <a:prstGeom prst="straightConnector1">
+            <a:avLst/>
+          </a:prstGeom>
+          <a:ln>
+            <a:tailEnd type="triangle"/>
+          </a:ln>
+        </p:spPr>
+        <p:style>
+          <a:lnRef idx="1">
+            <a:schemeClr val="dk1"/>
+          </a:lnRef>
+          <a:fillRef idx="0">
+            <a:schemeClr val="dk1"/>
+          </a:fillRef>
+          <a:effectRef idx="0">
+            <a:schemeClr val="dk1"/>
+          </a:effectRef>
+          <a:fontRef idx="minor">
+            <a:schemeClr val="tx1"/>
+          </a:fontRef>
+        </p:style>
+      </p:cxnSp>
+      <p:cxnSp>
+        <p:nvCxnSpPr>
+          <p:cNvPr id="82" name="Straight Arrow Connector 81">
+            <a:extLst>
+              <a:ext uri="{FF2B5EF4-FFF2-40B4-BE49-F238E27FC236}">
+                <a16:creationId xmlns:a16="http://schemas.microsoft.com/office/drawing/2014/main" id="{F23942F1-B834-44EA-A43F-CAA646996E02}"/>
+              </a:ext>
+            </a:extLst>
+          </p:cNvPr>
+          <p:cNvCxnSpPr/>
+          <p:nvPr/>
+        </p:nvCxnSpPr>
+        <p:spPr>
+          <a:xfrm>
+            <a:off x="3307877" y="2511922"/>
+            <a:ext cx="252000" cy="0"/>
+          </a:xfrm>
+          <a:prstGeom prst="straightConnector1">
+            <a:avLst/>
+          </a:prstGeom>
+          <a:ln>
+            <a:tailEnd type="triangle"/>
+          </a:ln>
+        </p:spPr>
+        <p:style>
+          <a:lnRef idx="1">
+            <a:schemeClr val="dk1"/>
+          </a:lnRef>
+          <a:fillRef idx="0">
+            <a:schemeClr val="dk1"/>
+          </a:fillRef>
+          <a:effectRef idx="0">
+            <a:schemeClr val="dk1"/>
+          </a:effectRef>
+          <a:fontRef idx="minor">
+            <a:schemeClr val="tx1"/>
+          </a:fontRef>
+        </p:style>
+      </p:cxnSp>
+      <p:sp>
+        <p:nvSpPr>
+          <p:cNvPr id="83" name="TextBox 82">
+            <a:extLst>
+              <a:ext uri="{FF2B5EF4-FFF2-40B4-BE49-F238E27FC236}">
+                <a16:creationId xmlns:a16="http://schemas.microsoft.com/office/drawing/2014/main" id="{7F934B66-5DD8-4585-B99C-F0BCB9AA5BDC}"/>
+              </a:ext>
+            </a:extLst>
+          </p:cNvPr>
+          <p:cNvSpPr txBox="1"/>
+          <p:nvPr/>
+        </p:nvSpPr>
+        <p:spPr>
+          <a:xfrm>
+            <a:off x="5133029" y="1612358"/>
+            <a:ext cx="848309" cy="1042352"/>
+          </a:xfrm>
+          <a:prstGeom prst="rect">
+            <a:avLst/>
+          </a:prstGeom>
+          <a:solidFill>
+            <a:schemeClr val="bg2"/>
+          </a:solidFill>
+          <a:ln>
+            <a:solidFill>
+              <a:schemeClr val="tx1"/>
+            </a:solidFill>
+          </a:ln>
+        </p:spPr>
+        <p:style>
+          <a:lnRef idx="2">
+            <a:schemeClr val="dk1"/>
+          </a:lnRef>
+          <a:fillRef idx="1">
+            <a:schemeClr val="lt1"/>
+          </a:fillRef>
+          <a:effectRef idx="0">
+            <a:schemeClr val="dk1"/>
+          </a:effectRef>
+          <a:fontRef idx="minor">
+            <a:schemeClr val="dk1"/>
+          </a:fontRef>
+        </p:style>
+        <p:txBody>
+          <a:bodyPr wrap="none" rtlCol="0" anchor="ctr" anchorCtr="0">
+            <a:noAutofit/>
+          </a:bodyPr>
+          <a:lstStyle/>
+          <a:p>
+            <a:pPr algn="ctr"/>
+            <a:r>
+              <a:rPr lang="en-US" sz="1100" dirty="0"/>
+              <a:t>Rule: </a:t>
+            </a:r>
+            <a:br>
+              <a:rPr lang="en-US" sz="1100" dirty="0"/>
+            </a:br>
+            <a:r>
+              <a:rPr lang="en-US" sz="1100" dirty="0"/>
+              <a:t>Merge data</a:t>
+            </a:r>
+          </a:p>
+        </p:txBody>
+      </p:sp>
+      <p:sp>
+        <p:nvSpPr>
+          <p:cNvPr id="84" name="TextBox 83">
+            <a:extLst>
+              <a:ext uri="{FF2B5EF4-FFF2-40B4-BE49-F238E27FC236}">
+                <a16:creationId xmlns:a16="http://schemas.microsoft.com/office/drawing/2014/main" id="{5051C759-7ECE-417A-A39D-5CC7D8F81F65}"/>
+              </a:ext>
+            </a:extLst>
+          </p:cNvPr>
+          <p:cNvSpPr txBox="1"/>
+          <p:nvPr/>
+        </p:nvSpPr>
+        <p:spPr>
+          <a:xfrm>
+            <a:off x="6253508" y="1994213"/>
+            <a:ext cx="1135247" cy="261610"/>
+          </a:xfrm>
+          <a:prstGeom prst="rect">
+            <a:avLst/>
+          </a:prstGeom>
+        </p:spPr>
+        <p:style>
+          <a:lnRef idx="2">
+            <a:schemeClr val="dk1"/>
+          </a:lnRef>
+          <a:fillRef idx="1">
+            <a:schemeClr val="lt1"/>
+          </a:fillRef>
+          <a:effectRef idx="0">
+            <a:schemeClr val="dk1"/>
+          </a:effectRef>
+          <a:fontRef idx="minor">
+            <a:schemeClr val="dk1"/>
+          </a:fontRef>
+        </p:style>
+        <p:txBody>
+          <a:bodyPr wrap="none" rtlCol="0">
+            <a:spAutoFit/>
+          </a:bodyPr>
+          <a:lstStyle/>
+          <a:p>
+            <a:r>
+              <a:rPr lang="en-US" sz="1100" dirty="0"/>
+              <a:t>merged data.csv</a:t>
+            </a:r>
+          </a:p>
+        </p:txBody>
+      </p:sp>
+      <p:cxnSp>
+        <p:nvCxnSpPr>
+          <p:cNvPr id="85" name="Straight Arrow Connector 84">
+            <a:extLst>
+              <a:ext uri="{FF2B5EF4-FFF2-40B4-BE49-F238E27FC236}">
+                <a16:creationId xmlns:a16="http://schemas.microsoft.com/office/drawing/2014/main" id="{03295C50-E9FF-4B41-9E31-5D2E43911E9A}"/>
+              </a:ext>
+            </a:extLst>
+          </p:cNvPr>
+          <p:cNvCxnSpPr>
+            <a:cxnSpLocks/>
+            <a:endCxn id="83" idx="1"/>
+          </p:cNvCxnSpPr>
+          <p:nvPr/>
+        </p:nvCxnSpPr>
+        <p:spPr>
+          <a:xfrm>
+            <a:off x="4788581" y="1732111"/>
+            <a:ext cx="344448" cy="401423"/>
+          </a:xfrm>
+          <a:prstGeom prst="straightConnector1">
+            <a:avLst/>
+          </a:prstGeom>
+          <a:ln>
+            <a:tailEnd type="none"/>
+          </a:ln>
+        </p:spPr>
+        <p:style>
+          <a:lnRef idx="1">
+            <a:schemeClr val="dk1"/>
+          </a:lnRef>
+          <a:fillRef idx="0">
+            <a:schemeClr val="dk1"/>
+          </a:fillRef>
+          <a:effectRef idx="0">
+            <a:schemeClr val="dk1"/>
+          </a:effectRef>
+          <a:fontRef idx="minor">
+            <a:schemeClr val="tx1"/>
+          </a:fontRef>
+        </p:style>
+      </p:cxnSp>
+      <p:cxnSp>
+        <p:nvCxnSpPr>
+          <p:cNvPr id="86" name="Straight Arrow Connector 85">
+            <a:extLst>
+              <a:ext uri="{FF2B5EF4-FFF2-40B4-BE49-F238E27FC236}">
+                <a16:creationId xmlns:a16="http://schemas.microsoft.com/office/drawing/2014/main" id="{F1D805DB-7912-41E4-BB9F-4BFB4D27FA8A}"/>
+              </a:ext>
+            </a:extLst>
+          </p:cNvPr>
+          <p:cNvCxnSpPr>
+            <a:cxnSpLocks/>
+            <a:stCxn id="78" idx="3"/>
+            <a:endCxn id="83" idx="1"/>
+          </p:cNvCxnSpPr>
+          <p:nvPr/>
+        </p:nvCxnSpPr>
+        <p:spPr>
+          <a:xfrm>
+            <a:off x="4772551" y="2133534"/>
+            <a:ext cx="360478" cy="0"/>
+          </a:xfrm>
+          <a:prstGeom prst="straightConnector1">
+            <a:avLst/>
+          </a:prstGeom>
+          <a:ln>
+            <a:tailEnd type="triangle"/>
+          </a:ln>
+        </p:spPr>
+        <p:style>
+          <a:lnRef idx="1">
+            <a:schemeClr val="dk1"/>
+          </a:lnRef>
+          <a:fillRef idx="0">
+            <a:schemeClr val="dk1"/>
+          </a:fillRef>
+          <a:effectRef idx="0">
+            <a:schemeClr val="dk1"/>
+          </a:effectRef>
+          <a:fontRef idx="minor">
+            <a:schemeClr val="tx1"/>
+          </a:fontRef>
+        </p:style>
+      </p:cxnSp>
+      <p:cxnSp>
+        <p:nvCxnSpPr>
+          <p:cNvPr id="87" name="Straight Arrow Connector 86">
+            <a:extLst>
+              <a:ext uri="{FF2B5EF4-FFF2-40B4-BE49-F238E27FC236}">
+                <a16:creationId xmlns:a16="http://schemas.microsoft.com/office/drawing/2014/main" id="{94069B5A-3747-49A5-A3DF-8448D724137F}"/>
+              </a:ext>
+            </a:extLst>
+          </p:cNvPr>
+          <p:cNvCxnSpPr>
+            <a:cxnSpLocks/>
+            <a:stCxn id="79" idx="3"/>
+            <a:endCxn id="83" idx="1"/>
+          </p:cNvCxnSpPr>
+          <p:nvPr/>
+        </p:nvCxnSpPr>
+        <p:spPr>
+          <a:xfrm flipV="1">
+            <a:off x="4788581" y="2133534"/>
+            <a:ext cx="344448" cy="390371"/>
+          </a:xfrm>
+          <a:prstGeom prst="straightConnector1">
+            <a:avLst/>
+          </a:prstGeom>
+          <a:ln>
+            <a:tailEnd type="none"/>
+          </a:ln>
+        </p:spPr>
+        <p:style>
+          <a:lnRef idx="1">
+            <a:schemeClr val="dk1"/>
+          </a:lnRef>
+          <a:fillRef idx="0">
+            <a:schemeClr val="dk1"/>
+          </a:fillRef>
+          <a:effectRef idx="0">
+            <a:schemeClr val="dk1"/>
+          </a:effectRef>
+          <a:fontRef idx="minor">
+            <a:schemeClr val="tx1"/>
+          </a:fontRef>
+        </p:style>
+      </p:cxnSp>
+      <p:cxnSp>
+        <p:nvCxnSpPr>
+          <p:cNvPr id="88" name="Straight Arrow Connector 87">
+            <a:extLst>
+              <a:ext uri="{FF2B5EF4-FFF2-40B4-BE49-F238E27FC236}">
+                <a16:creationId xmlns:a16="http://schemas.microsoft.com/office/drawing/2014/main" id="{90000F5D-37B1-4E11-8C43-C7B8CD99E08F}"/>
+              </a:ext>
+            </a:extLst>
+          </p:cNvPr>
+          <p:cNvCxnSpPr>
+            <a:cxnSpLocks/>
+          </p:cNvCxnSpPr>
+          <p:nvPr/>
+        </p:nvCxnSpPr>
+        <p:spPr>
+          <a:xfrm>
+            <a:off x="5981338" y="2133534"/>
+            <a:ext cx="252000" cy="0"/>
+          </a:xfrm>
+          <a:prstGeom prst="straightConnector1">
+            <a:avLst/>
+          </a:prstGeom>
+          <a:ln>
+            <a:tailEnd type="triangle"/>
+          </a:ln>
+        </p:spPr>
+        <p:style>
+          <a:lnRef idx="1">
+            <a:schemeClr val="dk1"/>
+          </a:lnRef>
+          <a:fillRef idx="0">
+            <a:schemeClr val="dk1"/>
+          </a:fillRef>
+          <a:effectRef idx="0">
+            <a:schemeClr val="dk1"/>
+          </a:effectRef>
+          <a:fontRef idx="minor">
+            <a:schemeClr val="tx1"/>
+          </a:fontRef>
+        </p:style>
+      </p:cxnSp>
+    </p:spTree>
+    <p:extLst>
+      <p:ext uri="{BB962C8B-B14F-4D97-AF65-F5344CB8AC3E}">
+        <p14:creationId xmlns:p14="http://schemas.microsoft.com/office/powerpoint/2010/main" val="1953264309"/>
+      </p:ext>
+    </p:extLst>
+  </p:cSld>
+  <p:clrMapOvr>
+    <a:masterClrMapping/>
+  </p:clrMapOvr>
+</p:sld>
+</file>
+
+<file path=ppt/slides/slide4.xml><?xml version="1.0" encoding="utf-8"?>
+<p:sld xmlns:a="http://schemas.openxmlformats.org/drawingml/2006/main" xmlns:r="http://schemas.openxmlformats.org/officeDocument/2006/relationships" xmlns:p="http://schemas.openxmlformats.org/presentationml/2006/main">
+  <p:cSld>
+    <p:spTree>
+      <p:nvGrpSpPr>
+        <p:cNvPr id="1" name=""/>
+        <p:cNvGrpSpPr/>
+        <p:nvPr/>
+      </p:nvGrpSpPr>
+      <p:grpSpPr>
+        <a:xfrm>
+          <a:off x="0" y="0"/>
+          <a:ext cx="0" cy="0"/>
+          <a:chOff x="0" y="0"/>
+          <a:chExt cx="0" cy="0"/>
+        </a:xfrm>
+      </p:grpSpPr>
+      <p:cxnSp>
+        <p:nvCxnSpPr>
           <p:cNvPr id="46" name="Curved Connector 45"/>
           <p:cNvCxnSpPr/>
           <p:nvPr/>
@@ -4680,40 +6677,23 @@
           <a:lstStyle/>
           <a:p>
             <a:r>
-              <a:rPr lang="en-US" sz="1100" b="1" dirty="0" smtClean="0"/>
+              <a:rPr lang="en-US" sz="1100" b="1" dirty="0"/>
               <a:t>Raw data</a:t>
-            </a:r>
-            <a:r>
-              <a:rPr lang="en-US" sz="1100" b="1" dirty="0"/>
-              <a:t/>
             </a:r>
             <a:br>
               <a:rPr lang="en-US" sz="1100" b="1" dirty="0"/>
             </a:br>
             <a:r>
-              <a:rPr lang="en-US" sz="900" i="1" dirty="0" smtClean="0"/>
-              <a:t>e.g</a:t>
-            </a:r>
-            <a:r>
-              <a:rPr lang="en-US" sz="900" i="1" dirty="0" smtClean="0"/>
-              <a:t>., files </a:t>
-            </a:r>
-            <a:r>
-              <a:rPr lang="en-US" sz="900" i="1" dirty="0" smtClean="0"/>
-              <a:t>on server</a:t>
-            </a:r>
-            <a:r>
-              <a:rPr lang="en-US" sz="900" i="1" dirty="0" smtClean="0"/>
-              <a:t>,</a:t>
+              <a:rPr lang="en-US" sz="900" i="1" dirty="0"/>
+              <a:t>e.g., files on server,</a:t>
             </a:r>
             <a:br>
-              <a:rPr lang="en-US" sz="900" i="1" dirty="0" smtClean="0"/>
+              <a:rPr lang="en-US" sz="900" i="1" dirty="0"/>
             </a:br>
             <a:r>
-              <a:rPr lang="en-US" sz="900" i="1" dirty="0" smtClean="0"/>
+              <a:rPr lang="en-US" sz="900" i="1" dirty="0"/>
               <a:t>or in a database;</a:t>
             </a:r>
-            <a:endParaRPr lang="en-US" sz="900" i="1" dirty="0"/>
           </a:p>
           <a:p>
             <a:r>
@@ -4809,12 +6789,8 @@
           <a:lstStyle/>
           <a:p>
             <a:r>
-              <a:rPr lang="en-US" sz="1100" b="1" dirty="0" smtClean="0"/>
+              <a:rPr lang="en-US" sz="1100" b="1" dirty="0"/>
               <a:t>Source code</a:t>
-            </a:r>
-            <a:r>
-              <a:rPr lang="en-US" sz="1100" b="1" dirty="0"/>
-              <a:t/>
             </a:r>
             <a:br>
               <a:rPr lang="en-US" sz="1100" b="1" dirty="0"/>
@@ -4996,12 +6972,8 @@
           <a:lstStyle/>
           <a:p>
             <a:r>
-              <a:rPr lang="en-US" sz="1100" b="1" dirty="0" smtClean="0"/>
+              <a:rPr lang="en-US" sz="1100" b="1" dirty="0"/>
               <a:t>File exchange</a:t>
-            </a:r>
-            <a:r>
-              <a:rPr lang="en-US" sz="1100" b="1" dirty="0"/>
-              <a:t/>
             </a:r>
             <a:br>
               <a:rPr lang="en-US" sz="1100" b="1" dirty="0"/>
@@ -5663,23 +7635,7 @@
             </a:br>
             <a:r>
               <a:rPr lang="en-US" sz="900" i="1" dirty="0"/>
-              <a:t>e.g., meeting notes, </a:t>
-            </a:r>
-            <a:r>
-              <a:rPr lang="en-US" sz="900" i="1" dirty="0" smtClean="0"/>
-              <a:t>literature: </a:t>
-            </a:r>
-            <a:r>
-              <a:rPr lang="en-US" sz="900" i="1" dirty="0"/>
-              <a:t>keep on </a:t>
-            </a:r>
-            <a:r>
-              <a:rPr lang="en-US" sz="900" i="1" dirty="0" smtClean="0"/>
-              <a:t>cloud like Dropbox,</a:t>
-            </a:r>
-            <a:r>
-              <a:rPr lang="en-US" sz="900" i="1" dirty="0"/>
-              <a:t/>
+              <a:t>e.g., meeting notes, literature: keep on cloud like Dropbox,</a:t>
             </a:r>
             <a:br>
               <a:rPr lang="en-US" sz="900" i="1" dirty="0"/>
@@ -5723,12 +7679,8 @@
           <a:lstStyle/>
           <a:p>
             <a:r>
-              <a:rPr lang="en-US" sz="1100" b="1" dirty="0" smtClean="0"/>
+              <a:rPr lang="en-US" sz="1100" b="1" dirty="0"/>
               <a:t>Generated temp</a:t>
-            </a:r>
-            <a:r>
-              <a:rPr lang="en-US" sz="1100" b="1" dirty="0"/>
-              <a:t/>
             </a:r>
             <a:br>
               <a:rPr lang="en-US" sz="1100" b="1" dirty="0"/>

</xml_diff>